<commit_message>
Quasi fini ppt !
Manque que la conclusion
</commit_message>
<xml_diff>
--- a/Understanding Dracula.pptx
+++ b/Understanding Dracula.pptx
@@ -6,15 +6,23 @@
   </p:sldMasterIdLst>
   <p:sldIdLst>
     <p:sldId id="256" r:id="rId2"/>
-    <p:sldId id="257" r:id="rId3"/>
-    <p:sldId id="259" r:id="rId4"/>
-    <p:sldId id="258" r:id="rId5"/>
-    <p:sldId id="260" r:id="rId6"/>
-    <p:sldId id="261" r:id="rId7"/>
-    <p:sldId id="262" r:id="rId8"/>
-    <p:sldId id="263" r:id="rId9"/>
-    <p:sldId id="264" r:id="rId10"/>
+    <p:sldId id="266" r:id="rId3"/>
+    <p:sldId id="267" r:id="rId4"/>
+    <p:sldId id="257" r:id="rId5"/>
+    <p:sldId id="259" r:id="rId6"/>
+    <p:sldId id="258" r:id="rId7"/>
+    <p:sldId id="260" r:id="rId8"/>
+    <p:sldId id="261" r:id="rId9"/>
+    <p:sldId id="262" r:id="rId10"/>
     <p:sldId id="265" r:id="rId11"/>
+    <p:sldId id="268" r:id="rId12"/>
+    <p:sldId id="269" r:id="rId13"/>
+    <p:sldId id="270" r:id="rId14"/>
+    <p:sldId id="271" r:id="rId15"/>
+    <p:sldId id="263" r:id="rId16"/>
+    <p:sldId id="264" r:id="rId17"/>
+    <p:sldId id="272" r:id="rId18"/>
+    <p:sldId id="273" r:id="rId19"/>
   </p:sldIdLst>
   <p:sldSz cx="12192000" cy="6858000"/>
   <p:notesSz cx="6858000" cy="9144000"/>
@@ -255,7 +263,7 @@
           <a:p>
             <a:fld id="{48A87A34-81AB-432B-8DAE-1953F412C126}" type="datetimeFigureOut">
               <a:rPr lang="en-US" dirty="0"/>
-              <a:t>12/9/2018</a:t>
+              <a:t>12/10/2018</a:t>
             </a:fld>
             <a:endParaRPr lang="en-US" dirty="0"/>
           </a:p>
@@ -430,7 +438,7 @@
           <a:p>
             <a:fld id="{48A87A34-81AB-432B-8DAE-1953F412C126}" type="datetimeFigureOut">
               <a:rPr lang="en-US" dirty="0"/>
-              <a:t>12/9/2018</a:t>
+              <a:t>12/10/2018</a:t>
             </a:fld>
             <a:endParaRPr lang="en-US" dirty="0"/>
           </a:p>
@@ -609,7 +617,7 @@
           <a:p>
             <a:fld id="{48A87A34-81AB-432B-8DAE-1953F412C126}" type="datetimeFigureOut">
               <a:rPr lang="en-US" dirty="0"/>
-              <a:t>12/9/2018</a:t>
+              <a:t>12/10/2018</a:t>
             </a:fld>
             <a:endParaRPr lang="en-US" dirty="0"/>
           </a:p>
@@ -774,7 +782,7 @@
           <a:p>
             <a:fld id="{48A87A34-81AB-432B-8DAE-1953F412C126}" type="datetimeFigureOut">
               <a:rPr lang="en-US" dirty="0"/>
-              <a:t>12/9/2018</a:t>
+              <a:t>12/10/2018</a:t>
             </a:fld>
             <a:endParaRPr lang="en-US" dirty="0"/>
           </a:p>
@@ -1017,7 +1025,7 @@
           <a:p>
             <a:fld id="{48A87A34-81AB-432B-8DAE-1953F412C126}" type="datetimeFigureOut">
               <a:rPr lang="en-US" dirty="0"/>
-              <a:t>12/9/2018</a:t>
+              <a:t>12/10/2018</a:t>
             </a:fld>
             <a:endParaRPr lang="en-US" dirty="0"/>
           </a:p>
@@ -1249,7 +1257,7 @@
           <a:p>
             <a:fld id="{48A87A34-81AB-432B-8DAE-1953F412C126}" type="datetimeFigureOut">
               <a:rPr lang="en-US" dirty="0"/>
-              <a:t>12/9/2018</a:t>
+              <a:t>12/10/2018</a:t>
             </a:fld>
             <a:endParaRPr lang="en-US" dirty="0"/>
           </a:p>
@@ -1629,7 +1637,7 @@
           <a:p>
             <a:fld id="{48A87A34-81AB-432B-8DAE-1953F412C126}" type="datetimeFigureOut">
               <a:rPr lang="en-US" dirty="0"/>
-              <a:t>12/9/2018</a:t>
+              <a:t>12/10/2018</a:t>
             </a:fld>
             <a:endParaRPr lang="en-US" dirty="0"/>
           </a:p>
@@ -1742,7 +1750,7 @@
           <a:p>
             <a:fld id="{48A87A34-81AB-432B-8DAE-1953F412C126}" type="datetimeFigureOut">
               <a:rPr lang="en-US" dirty="0"/>
-              <a:t>12/9/2018</a:t>
+              <a:t>12/10/2018</a:t>
             </a:fld>
             <a:endParaRPr lang="en-US" dirty="0"/>
           </a:p>
@@ -1832,7 +1840,7 @@
           <a:p>
             <a:fld id="{48A87A34-81AB-432B-8DAE-1953F412C126}" type="datetimeFigureOut">
               <a:rPr lang="en-US" dirty="0"/>
-              <a:t>12/9/2018</a:t>
+              <a:t>12/10/2018</a:t>
             </a:fld>
             <a:endParaRPr lang="en-US" dirty="0"/>
           </a:p>
@@ -2078,7 +2086,7 @@
           <a:p>
             <a:fld id="{48A87A34-81AB-432B-8DAE-1953F412C126}" type="datetimeFigureOut">
               <a:rPr lang="en-US" dirty="0"/>
-              <a:t>12/9/2018</a:t>
+              <a:t>12/10/2018</a:t>
             </a:fld>
             <a:endParaRPr lang="en-US" dirty="0"/>
           </a:p>
@@ -2465,7 +2473,7 @@
             <a:fld id="{48A87A34-81AB-432B-8DAE-1953F412C126}" type="datetimeFigureOut">
               <a:rPr lang="en-US" dirty="0"/>
               <a:pPr/>
-              <a:t>12/9/2018</a:t>
+              <a:t>12/10/2018</a:t>
             </a:fld>
             <a:endParaRPr lang="en-US" dirty="0"/>
           </a:p>
@@ -2678,7 +2686,7 @@
             <a:fld id="{48A87A34-81AB-432B-8DAE-1953F412C126}" type="datetimeFigureOut">
               <a:rPr lang="en-US" dirty="0"/>
               <a:pPr/>
-              <a:t>12/9/2018</a:t>
+              <a:t>12/10/2018</a:t>
             </a:fld>
             <a:endParaRPr lang="en-US" dirty="0"/>
           </a:p>
@@ -3245,7 +3253,7 @@
           <p:cNvPr id="6" name="Sous-titre 2">
             <a:extLst>
               <a:ext uri="{FF2B5EF4-FFF2-40B4-BE49-F238E27FC236}">
-                <a16:creationId xmlns:a16="http://schemas.microsoft.com/office/drawing/2014/main" xmlns="" id="{C4566099-AAD9-4AAA-9D26-572BF887E13C}"/>
+                <a16:creationId xmlns="" xmlns:a16="http://schemas.microsoft.com/office/drawing/2014/main" id="{C4566099-AAD9-4AAA-9D26-572BF887E13C}"/>
               </a:ext>
             </a:extLst>
           </p:cNvPr>
@@ -3586,7 +3594,7 @@
           <p:cNvPr id="2" name="Titre 1">
             <a:extLst>
               <a:ext uri="{FF2B5EF4-FFF2-40B4-BE49-F238E27FC236}">
-                <a16:creationId xmlns:a16="http://schemas.microsoft.com/office/drawing/2014/main" xmlns="" id="{A093F50F-C593-40A9-95E7-FFE1F76D3966}"/>
+                <a16:creationId xmlns="" xmlns:a16="http://schemas.microsoft.com/office/drawing/2014/main" id="{A093F50F-C593-40A9-95E7-FFE1F76D3966}"/>
               </a:ext>
             </a:extLst>
           </p:cNvPr>
@@ -3597,11 +3605,20 @@
             <p:ph type="title"/>
           </p:nvPr>
         </p:nvSpPr>
-        <p:spPr/>
+        <p:spPr>
+          <a:xfrm>
+            <a:off x="1451579" y="635185"/>
+            <a:ext cx="9291215" cy="1049235"/>
+          </a:xfrm>
+        </p:spPr>
         <p:txBody>
           <a:bodyPr/>
           <a:lstStyle/>
           <a:p>
+            <a:r>
+              <a:rPr lang="fr-BE" smtClean="0"/>
+              <a:t>Frequent itemsets</a:t>
+            </a:r>
             <a:endParaRPr lang="fr-BE"/>
           </a:p>
         </p:txBody>
@@ -3611,7 +3628,7 @@
           <p:cNvPr id="3" name="Espace réservé du contenu 2">
             <a:extLst>
               <a:ext uri="{FF2B5EF4-FFF2-40B4-BE49-F238E27FC236}">
-                <a16:creationId xmlns:a16="http://schemas.microsoft.com/office/drawing/2014/main" xmlns="" id="{1A485B1E-6CDE-46C3-9E2C-1F013AFAAE45}"/>
+                <a16:creationId xmlns="" xmlns:a16="http://schemas.microsoft.com/office/drawing/2014/main" id="{1A485B1E-6CDE-46C3-9E2C-1F013AFAAE45}"/>
               </a:ext>
             </a:extLst>
           </p:cNvPr>
@@ -3622,12 +3639,97 @@
             <p:ph idx="1"/>
           </p:nvPr>
         </p:nvSpPr>
-        <p:spPr/>
-        <p:txBody>
-          <a:bodyPr/>
-          <a:lstStyle/>
-          <a:p>
-            <a:endParaRPr lang="fr-BE"/>
+        <p:spPr>
+          <a:xfrm>
+            <a:off x="1451579" y="1738488"/>
+            <a:ext cx="9291215" cy="3849511"/>
+          </a:xfrm>
+        </p:spPr>
+        <p:txBody>
+          <a:bodyPr>
+            <a:normAutofit fontScale="77500" lnSpcReduction="20000"/>
+          </a:bodyPr>
+          <a:lstStyle/>
+          <a:p>
+            <a:pPr marL="0" indent="0" fontAlgn="base">
+              <a:buNone/>
+            </a:pPr>
+            <a:r>
+              <a:rPr lang="en-US" b="1" smtClean="0"/>
+              <a:t>PREPROCESSING</a:t>
+            </a:r>
+          </a:p>
+          <a:p>
+            <a:pPr fontAlgn="base"/>
+            <a:r>
+              <a:rPr lang="en-US" smtClean="0"/>
+              <a:t>Dividing </a:t>
+            </a:r>
+            <a:r>
+              <a:rPr lang="en-US"/>
+              <a:t>the book in chapters</a:t>
+            </a:r>
+          </a:p>
+          <a:p>
+            <a:pPr fontAlgn="base"/>
+            <a:r>
+              <a:rPr lang="en-US"/>
+              <a:t>Dividing  every chapter in sentences</a:t>
+            </a:r>
+          </a:p>
+          <a:p>
+            <a:pPr fontAlgn="base"/>
+            <a:r>
+              <a:rPr lang="en-US"/>
+              <a:t>Removing stopwords (obtained in the Natural Language Toolkit) and punctuation</a:t>
+            </a:r>
+          </a:p>
+          <a:p>
+            <a:pPr fontAlgn="base"/>
+            <a:r>
+              <a:rPr lang="en-US"/>
+              <a:t>Dividing  every sentence in words</a:t>
+            </a:r>
+          </a:p>
+          <a:p>
+            <a:pPr fontAlgn="base"/>
+            <a:r>
+              <a:rPr lang="en-US"/>
+              <a:t>Keeping only words that were found in a set of character names we assembled :</a:t>
+            </a:r>
+          </a:p>
+          <a:p>
+            <a:pPr marL="457200" lvl="1" indent="0">
+              <a:buNone/>
+            </a:pPr>
+            <a:r>
+              <a:rPr lang="en-US"/>
+              <a:t>["count", "dracula", "beast", "vampire", "jonathan", "mina", "murray","arthur", "holwood", "quincey", "morris", "renfield", "john", "seward", "abraham", "helsing", "lucy", "westenra"]</a:t>
+            </a:r>
+            <a:endParaRPr lang="en-US"/>
+          </a:p>
+          <a:p>
+            <a:pPr fontAlgn="base"/>
+            <a:r>
+              <a:rPr lang="en-US"/>
+              <a:t>Replacing every one of these character names by a single identifying name (e.g. : "count" -&gt; "Count Dracula")</a:t>
+            </a:r>
+          </a:p>
+          <a:p>
+            <a:pPr fontAlgn="base"/>
+            <a:r>
+              <a:rPr lang="en-US"/>
+              <a:t>Replacing  sets of characters that consisted of the same character multiple times by sets containing only </a:t>
+            </a:r>
+            <a:r>
+              <a:rPr lang="en-US"/>
+              <a:t>the </a:t>
+            </a:r>
+            <a:r>
+              <a:rPr lang="en-US" smtClean="0"/>
+              <a:t>character</a:t>
+            </a:r>
+            <a:endParaRPr lang="en-US"/>
           </a:p>
         </p:txBody>
       </p:sp>
@@ -3635,6 +3737,1430 @@
     <p:extLst>
       <p:ext uri="{BB962C8B-B14F-4D97-AF65-F5344CB8AC3E}">
         <p14:creationId xmlns:p14="http://schemas.microsoft.com/office/powerpoint/2010/main" val="3762728471"/>
+      </p:ext>
+    </p:extLst>
+  </p:cSld>
+  <p:clrMapOvr>
+    <a:masterClrMapping/>
+  </p:clrMapOvr>
+</p:sld>
+</file>
+
+<file path=ppt/slides/slide11.xml><?xml version="1.0" encoding="utf-8"?>
+<p:sld xmlns:a="http://schemas.openxmlformats.org/drawingml/2006/main" xmlns:r="http://schemas.openxmlformats.org/officeDocument/2006/relationships" xmlns:p="http://schemas.openxmlformats.org/presentationml/2006/main">
+  <p:cSld>
+    <p:spTree>
+      <p:nvGrpSpPr>
+        <p:cNvPr id="1" name=""/>
+        <p:cNvGrpSpPr/>
+        <p:nvPr/>
+      </p:nvGrpSpPr>
+      <p:grpSpPr>
+        <a:xfrm>
+          <a:off x="0" y="0"/>
+          <a:ext cx="0" cy="0"/>
+          <a:chOff x="0" y="0"/>
+          <a:chExt cx="0" cy="0"/>
+        </a:xfrm>
+      </p:grpSpPr>
+      <p:sp>
+        <p:nvSpPr>
+          <p:cNvPr id="2" name="Titre 1">
+            <a:extLst>
+              <a:ext uri="{FF2B5EF4-FFF2-40B4-BE49-F238E27FC236}">
+                <a16:creationId xmlns="" xmlns:a16="http://schemas.microsoft.com/office/drawing/2014/main" id="{A093F50F-C593-40A9-95E7-FFE1F76D3966}"/>
+              </a:ext>
+            </a:extLst>
+          </p:cNvPr>
+          <p:cNvSpPr>
+            <a:spLocks noGrp="1"/>
+          </p:cNvSpPr>
+          <p:nvPr>
+            <p:ph type="title"/>
+          </p:nvPr>
+        </p:nvSpPr>
+        <p:spPr>
+          <a:xfrm>
+            <a:off x="1451579" y="443274"/>
+            <a:ext cx="9291215" cy="1049235"/>
+          </a:xfrm>
+        </p:spPr>
+        <p:txBody>
+          <a:bodyPr/>
+          <a:lstStyle/>
+          <a:p>
+            <a:r>
+              <a:rPr lang="fr-BE" smtClean="0"/>
+              <a:t>Frequent itemsets</a:t>
+            </a:r>
+            <a:endParaRPr lang="fr-BE"/>
+          </a:p>
+        </p:txBody>
+      </p:sp>
+      <p:sp>
+        <p:nvSpPr>
+          <p:cNvPr id="3" name="Espace réservé du contenu 2">
+            <a:extLst>
+              <a:ext uri="{FF2B5EF4-FFF2-40B4-BE49-F238E27FC236}">
+                <a16:creationId xmlns="" xmlns:a16="http://schemas.microsoft.com/office/drawing/2014/main" id="{1A485B1E-6CDE-46C3-9E2C-1F013AFAAE45}"/>
+              </a:ext>
+            </a:extLst>
+          </p:cNvPr>
+          <p:cNvSpPr>
+            <a:spLocks noGrp="1"/>
+          </p:cNvSpPr>
+          <p:nvPr>
+            <p:ph idx="1"/>
+          </p:nvPr>
+        </p:nvSpPr>
+        <p:spPr>
+          <a:xfrm>
+            <a:off x="1451579" y="1444976"/>
+            <a:ext cx="9291215" cy="4481689"/>
+          </a:xfrm>
+        </p:spPr>
+        <p:txBody>
+          <a:bodyPr>
+            <a:normAutofit fontScale="77500" lnSpcReduction="20000"/>
+          </a:bodyPr>
+          <a:lstStyle/>
+          <a:p>
+            <a:pPr marL="0" indent="0" fontAlgn="base">
+              <a:buNone/>
+            </a:pPr>
+            <a:r>
+              <a:rPr lang="en-US" b="1"/>
+              <a:t>IMPLEMENTING APRIORI</a:t>
+            </a:r>
+          </a:p>
+          <a:p>
+            <a:r>
+              <a:rPr lang="en-US" smtClean="0"/>
+              <a:t>Parameters </a:t>
+            </a:r>
+            <a:r>
+              <a:rPr lang="en-US"/>
+              <a:t>:</a:t>
+            </a:r>
+          </a:p>
+          <a:p>
+            <a:pPr lvl="1"/>
+            <a:r>
+              <a:rPr lang="en-US"/>
+              <a:t>A list </a:t>
+            </a:r>
+            <a:r>
+              <a:rPr lang="en-US"/>
+              <a:t>of transactions (sets of names appearing </a:t>
+            </a:r>
+            <a:r>
+              <a:rPr lang="en-US"/>
+              <a:t>together)</a:t>
+            </a:r>
+          </a:p>
+          <a:p>
+            <a:pPr lvl="1"/>
+            <a:r>
+              <a:rPr lang="en-US"/>
+              <a:t>An integer </a:t>
+            </a:r>
+            <a:r>
+              <a:rPr lang="en-US"/>
+              <a:t>minimum support </a:t>
+            </a:r>
+            <a:r>
+              <a:rPr lang="en-US"/>
+              <a:t>and</a:t>
+            </a:r>
+          </a:p>
+          <a:p>
+            <a:pPr lvl="1"/>
+            <a:r>
+              <a:rPr lang="en-US"/>
+              <a:t>An integer </a:t>
+            </a:r>
+            <a:r>
+              <a:rPr lang="en-US"/>
+              <a:t>maximum length of character sets, and then proceeds as follow (for every chapter, as will be explained later):</a:t>
+            </a:r>
+            <a:endParaRPr lang="en-US"/>
+          </a:p>
+          <a:p>
+            <a:pPr fontAlgn="base"/>
+            <a:r>
+              <a:rPr lang="en-US"/>
+              <a:t>Creates a dictionary containing every character set and their support, if the latest is superior or equal to the minimum support</a:t>
+            </a:r>
+          </a:p>
+          <a:p>
+            <a:pPr fontAlgn="base"/>
+            <a:r>
+              <a:rPr lang="en-US"/>
+              <a:t>Starts a loop that :</a:t>
+            </a:r>
+          </a:p>
+          <a:p>
+            <a:pPr lvl="1" fontAlgn="base"/>
+            <a:r>
+              <a:rPr lang="en-US"/>
+              <a:t>Stops if there are no more character sets in the level if the level has reached the maximum length. Here the sets are ranked according to their level, which is the number of character appearing in them.</a:t>
+            </a:r>
+          </a:p>
+          <a:p>
+            <a:pPr lvl="1" fontAlgn="base"/>
+            <a:r>
+              <a:rPr lang="en-US"/>
+              <a:t>Looks at every set and verify if it is of a superior level and if it is a subset of a frequent set</a:t>
+            </a:r>
+          </a:p>
+          <a:p>
+            <a:pPr lvl="1" fontAlgn="base"/>
+            <a:r>
+              <a:rPr lang="en-US"/>
+              <a:t>If it is, computes its support based on its subsets and adds it on the next level (if it's not already there)</a:t>
+            </a:r>
+          </a:p>
+          <a:p>
+            <a:pPr fontAlgn="base"/>
+            <a:r>
+              <a:rPr lang="en-US"/>
+              <a:t>Returns a list of tuples containing two elements : a set of characters, and an integer representing the support of the set</a:t>
+            </a:r>
+          </a:p>
+        </p:txBody>
+      </p:sp>
+    </p:spTree>
+    <p:extLst>
+      <p:ext uri="{BB962C8B-B14F-4D97-AF65-F5344CB8AC3E}">
+        <p14:creationId xmlns:p14="http://schemas.microsoft.com/office/powerpoint/2010/main" val="542639880"/>
+      </p:ext>
+    </p:extLst>
+  </p:cSld>
+  <p:clrMapOvr>
+    <a:masterClrMapping/>
+  </p:clrMapOvr>
+</p:sld>
+</file>
+
+<file path=ppt/slides/slide12.xml><?xml version="1.0" encoding="utf-8"?>
+<p:sld xmlns:a="http://schemas.openxmlformats.org/drawingml/2006/main" xmlns:r="http://schemas.openxmlformats.org/officeDocument/2006/relationships" xmlns:p="http://schemas.openxmlformats.org/presentationml/2006/main">
+  <p:cSld>
+    <p:spTree>
+      <p:nvGrpSpPr>
+        <p:cNvPr id="1" name=""/>
+        <p:cNvGrpSpPr/>
+        <p:nvPr/>
+      </p:nvGrpSpPr>
+      <p:grpSpPr>
+        <a:xfrm>
+          <a:off x="0" y="0"/>
+          <a:ext cx="0" cy="0"/>
+          <a:chOff x="0" y="0"/>
+          <a:chExt cx="0" cy="0"/>
+        </a:xfrm>
+      </p:grpSpPr>
+      <p:sp>
+        <p:nvSpPr>
+          <p:cNvPr id="2" name="Titre 1">
+            <a:extLst>
+              <a:ext uri="{FF2B5EF4-FFF2-40B4-BE49-F238E27FC236}">
+                <a16:creationId xmlns="" xmlns:a16="http://schemas.microsoft.com/office/drawing/2014/main" id="{A093F50F-C593-40A9-95E7-FFE1F76D3966}"/>
+              </a:ext>
+            </a:extLst>
+          </p:cNvPr>
+          <p:cNvSpPr>
+            <a:spLocks noGrp="1"/>
+          </p:cNvSpPr>
+          <p:nvPr>
+            <p:ph type="title"/>
+          </p:nvPr>
+        </p:nvSpPr>
+        <p:spPr>
+          <a:xfrm>
+            <a:off x="1451579" y="443274"/>
+            <a:ext cx="9291215" cy="1049235"/>
+          </a:xfrm>
+        </p:spPr>
+        <p:txBody>
+          <a:bodyPr/>
+          <a:lstStyle/>
+          <a:p>
+            <a:r>
+              <a:rPr lang="fr-BE" smtClean="0"/>
+              <a:t>Frequent itemsets</a:t>
+            </a:r>
+            <a:endParaRPr lang="fr-BE"/>
+          </a:p>
+        </p:txBody>
+      </p:sp>
+      <p:sp>
+        <p:nvSpPr>
+          <p:cNvPr id="3" name="Espace réservé du contenu 2">
+            <a:extLst>
+              <a:ext uri="{FF2B5EF4-FFF2-40B4-BE49-F238E27FC236}">
+                <a16:creationId xmlns="" xmlns:a16="http://schemas.microsoft.com/office/drawing/2014/main" id="{1A485B1E-6CDE-46C3-9E2C-1F013AFAAE45}"/>
+              </a:ext>
+            </a:extLst>
+          </p:cNvPr>
+          <p:cNvSpPr>
+            <a:spLocks noGrp="1"/>
+          </p:cNvSpPr>
+          <p:nvPr>
+            <p:ph idx="1"/>
+          </p:nvPr>
+        </p:nvSpPr>
+        <p:spPr>
+          <a:xfrm>
+            <a:off x="1451579" y="1444976"/>
+            <a:ext cx="9291215" cy="4481689"/>
+          </a:xfrm>
+        </p:spPr>
+        <p:txBody>
+          <a:bodyPr>
+            <a:normAutofit/>
+          </a:bodyPr>
+          <a:lstStyle/>
+          <a:p>
+            <a:pPr marL="0" indent="0">
+              <a:buNone/>
+            </a:pPr>
+            <a:r>
+              <a:rPr lang="fr-BE" b="1" smtClean="0"/>
+              <a:t>APPLYING THE ALGORITHM</a:t>
+            </a:r>
+            <a:endParaRPr lang="fr-BE" b="1"/>
+          </a:p>
+          <a:p>
+            <a:r>
+              <a:rPr lang="en-US" smtClean="0"/>
+              <a:t>Name sets </a:t>
+            </a:r>
+            <a:r>
+              <a:rPr lang="en-US"/>
+              <a:t>in codes (e.g. : "Count Dracula" -&gt; "a") in order to create a list that can easily be taken </a:t>
+            </a:r>
+            <a:r>
+              <a:rPr lang="en-US"/>
+              <a:t>as </a:t>
+            </a:r>
+            <a:r>
+              <a:rPr lang="en-US" smtClean="0"/>
+              <a:t>parameter</a:t>
+            </a:r>
+          </a:p>
+          <a:p>
+            <a:r>
+              <a:rPr lang="en-US" smtClean="0"/>
+              <a:t>Data = multiple chapters !</a:t>
+            </a:r>
+          </a:p>
+          <a:p>
+            <a:r>
+              <a:rPr lang="en-US" smtClean="0"/>
+              <a:t>Function that :</a:t>
+            </a:r>
+          </a:p>
+          <a:p>
+            <a:pPr lvl="1"/>
+            <a:r>
+              <a:rPr lang="en-US" smtClean="0"/>
+              <a:t>Converted </a:t>
+            </a:r>
+            <a:r>
+              <a:rPr lang="en-US"/>
+              <a:t>character names, strings, to identifying codes</a:t>
+            </a:r>
+          </a:p>
+          <a:p>
+            <a:pPr lvl="1" fontAlgn="base"/>
+            <a:r>
+              <a:rPr lang="en-US"/>
+              <a:t>Applied Apriori on every chapter, and returned a list of "traditional" Apriori returns</a:t>
+            </a:r>
+          </a:p>
+          <a:p>
+            <a:pPr lvl="1" fontAlgn="base"/>
+            <a:r>
+              <a:rPr lang="en-US"/>
+              <a:t>Converted character codes back </a:t>
+            </a:r>
+            <a:r>
+              <a:rPr lang="en-US"/>
+              <a:t>to </a:t>
+            </a:r>
+            <a:r>
+              <a:rPr lang="en-US" smtClean="0"/>
+              <a:t>strings</a:t>
+            </a:r>
+            <a:endParaRPr lang="en-US"/>
+          </a:p>
+          <a:p>
+            <a:pPr fontAlgn="base"/>
+            <a:r>
+              <a:rPr lang="en-US" smtClean="0"/>
+              <a:t>Returns : list &gt; chapters &gt; frequent itemsets &gt; names set &amp; support</a:t>
+            </a:r>
+          </a:p>
+        </p:txBody>
+      </p:sp>
+    </p:spTree>
+    <p:extLst>
+      <p:ext uri="{BB962C8B-B14F-4D97-AF65-F5344CB8AC3E}">
+        <p14:creationId xmlns:p14="http://schemas.microsoft.com/office/powerpoint/2010/main" val="891740537"/>
+      </p:ext>
+    </p:extLst>
+  </p:cSld>
+  <p:clrMapOvr>
+    <a:masterClrMapping/>
+  </p:clrMapOvr>
+</p:sld>
+</file>
+
+<file path=ppt/slides/slide13.xml><?xml version="1.0" encoding="utf-8"?>
+<p:sld xmlns:a="http://schemas.openxmlformats.org/drawingml/2006/main" xmlns:r="http://schemas.openxmlformats.org/officeDocument/2006/relationships" xmlns:p="http://schemas.openxmlformats.org/presentationml/2006/main">
+  <p:cSld>
+    <p:spTree>
+      <p:nvGrpSpPr>
+        <p:cNvPr id="1" name=""/>
+        <p:cNvGrpSpPr/>
+        <p:nvPr/>
+      </p:nvGrpSpPr>
+      <p:grpSpPr>
+        <a:xfrm>
+          <a:off x="0" y="0"/>
+          <a:ext cx="0" cy="0"/>
+          <a:chOff x="0" y="0"/>
+          <a:chExt cx="0" cy="0"/>
+        </a:xfrm>
+      </p:grpSpPr>
+      <p:sp>
+        <p:nvSpPr>
+          <p:cNvPr id="2" name="Titre 1">
+            <a:extLst>
+              <a:ext uri="{FF2B5EF4-FFF2-40B4-BE49-F238E27FC236}">
+                <a16:creationId xmlns="" xmlns:a16="http://schemas.microsoft.com/office/drawing/2014/main" id="{A093F50F-C593-40A9-95E7-FFE1F76D3966}"/>
+              </a:ext>
+            </a:extLst>
+          </p:cNvPr>
+          <p:cNvSpPr>
+            <a:spLocks noGrp="1"/>
+          </p:cNvSpPr>
+          <p:nvPr>
+            <p:ph type="title"/>
+          </p:nvPr>
+        </p:nvSpPr>
+        <p:spPr>
+          <a:xfrm>
+            <a:off x="1451579" y="443274"/>
+            <a:ext cx="9291215" cy="1049235"/>
+          </a:xfrm>
+        </p:spPr>
+        <p:txBody>
+          <a:bodyPr/>
+          <a:lstStyle/>
+          <a:p>
+            <a:r>
+              <a:rPr lang="fr-BE" smtClean="0"/>
+              <a:t>Frequent itemsets</a:t>
+            </a:r>
+            <a:endParaRPr lang="fr-BE"/>
+          </a:p>
+        </p:txBody>
+      </p:sp>
+      <p:sp>
+        <p:nvSpPr>
+          <p:cNvPr id="3" name="Espace réservé du contenu 2">
+            <a:extLst>
+              <a:ext uri="{FF2B5EF4-FFF2-40B4-BE49-F238E27FC236}">
+                <a16:creationId xmlns="" xmlns:a16="http://schemas.microsoft.com/office/drawing/2014/main" id="{1A485B1E-6CDE-46C3-9E2C-1F013AFAAE45}"/>
+              </a:ext>
+            </a:extLst>
+          </p:cNvPr>
+          <p:cNvSpPr>
+            <a:spLocks noGrp="1"/>
+          </p:cNvSpPr>
+          <p:nvPr>
+            <p:ph idx="1"/>
+          </p:nvPr>
+        </p:nvSpPr>
+        <p:spPr>
+          <a:xfrm>
+            <a:off x="1451579" y="1444976"/>
+            <a:ext cx="9291215" cy="4481689"/>
+          </a:xfrm>
+        </p:spPr>
+        <p:txBody>
+          <a:bodyPr>
+            <a:normAutofit/>
+          </a:bodyPr>
+          <a:lstStyle/>
+          <a:p>
+            <a:pPr marL="0" indent="0">
+              <a:buNone/>
+            </a:pPr>
+            <a:r>
+              <a:rPr lang="fr-BE" b="1" smtClean="0"/>
+              <a:t>APPLYING THE ALGORITHM</a:t>
+            </a:r>
+            <a:endParaRPr lang="fr-BE" b="1"/>
+          </a:p>
+          <a:p>
+            <a:r>
+              <a:rPr lang="en-US" smtClean="0"/>
+              <a:t>Name sets </a:t>
+            </a:r>
+            <a:r>
+              <a:rPr lang="en-US"/>
+              <a:t>in codes (e.g. : "Count Dracula" -&gt; "a") in order to create a list that can easily be taken </a:t>
+            </a:r>
+            <a:r>
+              <a:rPr lang="en-US"/>
+              <a:t>as </a:t>
+            </a:r>
+            <a:r>
+              <a:rPr lang="en-US" smtClean="0"/>
+              <a:t>parameter</a:t>
+            </a:r>
+          </a:p>
+          <a:p>
+            <a:r>
+              <a:rPr lang="en-US" smtClean="0"/>
+              <a:t>Data = multiple chapters !</a:t>
+            </a:r>
+          </a:p>
+          <a:p>
+            <a:r>
+              <a:rPr lang="en-US" smtClean="0"/>
+              <a:t>Function that :</a:t>
+            </a:r>
+          </a:p>
+          <a:p>
+            <a:pPr lvl="1"/>
+            <a:r>
+              <a:rPr lang="en-US" smtClean="0"/>
+              <a:t>Converted </a:t>
+            </a:r>
+            <a:r>
+              <a:rPr lang="en-US"/>
+              <a:t>character names, strings, to identifying codes</a:t>
+            </a:r>
+          </a:p>
+          <a:p>
+            <a:pPr lvl="1" fontAlgn="base"/>
+            <a:r>
+              <a:rPr lang="en-US"/>
+              <a:t>Applied Apriori on every chapter, and returned a list of "traditional" Apriori returns</a:t>
+            </a:r>
+          </a:p>
+          <a:p>
+            <a:pPr lvl="1" fontAlgn="base"/>
+            <a:r>
+              <a:rPr lang="en-US"/>
+              <a:t>Converted character codes back </a:t>
+            </a:r>
+            <a:r>
+              <a:rPr lang="en-US"/>
+              <a:t>to </a:t>
+            </a:r>
+            <a:r>
+              <a:rPr lang="en-US" smtClean="0"/>
+              <a:t>strings</a:t>
+            </a:r>
+            <a:endParaRPr lang="en-US"/>
+          </a:p>
+          <a:p>
+            <a:pPr fontAlgn="base"/>
+            <a:r>
+              <a:rPr lang="en-US" smtClean="0"/>
+              <a:t>Returns : list &gt; chapters &gt; frequent itemsets &gt; names set &amp; support</a:t>
+            </a:r>
+          </a:p>
+        </p:txBody>
+      </p:sp>
+    </p:spTree>
+    <p:extLst>
+      <p:ext uri="{BB962C8B-B14F-4D97-AF65-F5344CB8AC3E}">
+        <p14:creationId xmlns:p14="http://schemas.microsoft.com/office/powerpoint/2010/main" val="710483857"/>
+      </p:ext>
+    </p:extLst>
+  </p:cSld>
+  <p:clrMapOvr>
+    <a:masterClrMapping/>
+  </p:clrMapOvr>
+</p:sld>
+</file>
+
+<file path=ppt/slides/slide14.xml><?xml version="1.0" encoding="utf-8"?>
+<p:sld xmlns:a="http://schemas.openxmlformats.org/drawingml/2006/main" xmlns:r="http://schemas.openxmlformats.org/officeDocument/2006/relationships" xmlns:p="http://schemas.openxmlformats.org/presentationml/2006/main">
+  <p:cSld>
+    <p:spTree>
+      <p:nvGrpSpPr>
+        <p:cNvPr id="1" name=""/>
+        <p:cNvGrpSpPr/>
+        <p:nvPr/>
+      </p:nvGrpSpPr>
+      <p:grpSpPr>
+        <a:xfrm>
+          <a:off x="0" y="0"/>
+          <a:ext cx="0" cy="0"/>
+          <a:chOff x="0" y="0"/>
+          <a:chExt cx="0" cy="0"/>
+        </a:xfrm>
+      </p:grpSpPr>
+      <p:sp>
+        <p:nvSpPr>
+          <p:cNvPr id="2" name="Titre 1">
+            <a:extLst>
+              <a:ext uri="{FF2B5EF4-FFF2-40B4-BE49-F238E27FC236}">
+                <a16:creationId xmlns="" xmlns:a16="http://schemas.microsoft.com/office/drawing/2014/main" id="{A093F50F-C593-40A9-95E7-FFE1F76D3966}"/>
+              </a:ext>
+            </a:extLst>
+          </p:cNvPr>
+          <p:cNvSpPr>
+            <a:spLocks noGrp="1"/>
+          </p:cNvSpPr>
+          <p:nvPr>
+            <p:ph type="title"/>
+          </p:nvPr>
+        </p:nvSpPr>
+        <p:spPr>
+          <a:xfrm>
+            <a:off x="1451579" y="443274"/>
+            <a:ext cx="9291215" cy="1049235"/>
+          </a:xfrm>
+        </p:spPr>
+        <p:txBody>
+          <a:bodyPr/>
+          <a:lstStyle/>
+          <a:p>
+            <a:r>
+              <a:rPr lang="fr-BE" smtClean="0"/>
+              <a:t>Frequent itemsets</a:t>
+            </a:r>
+            <a:endParaRPr lang="fr-BE"/>
+          </a:p>
+        </p:txBody>
+      </p:sp>
+      <p:pic>
+        <p:nvPicPr>
+          <p:cNvPr id="2050" name="Picture 2" descr="D:\Google Drive\DATS2MS\LINMA2472 Algorithms in data science\Project\Dracula\Images\fisplot.png"/>
+          <p:cNvPicPr>
+            <a:picLocks noChangeAspect="1" noChangeArrowheads="1"/>
+          </p:cNvPicPr>
+          <p:nvPr/>
+        </p:nvPicPr>
+        <p:blipFill>
+          <a:blip r:embed="rId2">
+            <a:extLst>
+              <a:ext uri="{28A0092B-C50C-407E-A947-70E740481C1C}">
+                <a14:useLocalDpi xmlns:a14="http://schemas.microsoft.com/office/drawing/2010/main" val="0"/>
+              </a:ext>
+            </a:extLst>
+          </a:blip>
+          <a:srcRect/>
+          <a:stretch>
+            <a:fillRect/>
+          </a:stretch>
+        </p:blipFill>
+        <p:spPr bwMode="auto">
+          <a:xfrm>
+            <a:off x="756179" y="1499306"/>
+            <a:ext cx="8294819" cy="4946650"/>
+          </a:xfrm>
+          <a:prstGeom prst="rect">
+            <a:avLst/>
+          </a:prstGeom>
+          <a:noFill/>
+          <a:extLst>
+            <a:ext uri="{909E8E84-426E-40DD-AFC4-6F175D3DCCD1}">
+              <a14:hiddenFill xmlns:a14="http://schemas.microsoft.com/office/drawing/2010/main">
+                <a:solidFill>
+                  <a:srgbClr val="FFFFFF"/>
+                </a:solidFill>
+              </a14:hiddenFill>
+            </a:ext>
+          </a:extLst>
+        </p:spPr>
+      </p:pic>
+      <p:sp>
+        <p:nvSpPr>
+          <p:cNvPr id="6" name="Espace réservé du contenu 2">
+            <a:extLst>
+              <a:ext uri="{FF2B5EF4-FFF2-40B4-BE49-F238E27FC236}">
+                <a16:creationId xmlns="" xmlns:a16="http://schemas.microsoft.com/office/drawing/2014/main" id="{1A485B1E-6CDE-46C3-9E2C-1F013AFAAE45}"/>
+              </a:ext>
+            </a:extLst>
+          </p:cNvPr>
+          <p:cNvSpPr>
+            <a:spLocks noGrp="1"/>
+          </p:cNvSpPr>
+          <p:nvPr>
+            <p:ph idx="1"/>
+          </p:nvPr>
+        </p:nvSpPr>
+        <p:spPr>
+          <a:xfrm>
+            <a:off x="9550400" y="1499306"/>
+            <a:ext cx="2178756" cy="4212872"/>
+          </a:xfrm>
+        </p:spPr>
+        <p:txBody>
+          <a:bodyPr>
+            <a:normAutofit/>
+          </a:bodyPr>
+          <a:lstStyle/>
+          <a:p>
+            <a:r>
+              <a:rPr lang="en-US" smtClean="0"/>
+              <a:t>Diaries :</a:t>
+            </a:r>
+          </a:p>
+          <a:p>
+            <a:pPr lvl="1"/>
+            <a:r>
+              <a:rPr lang="en-US" smtClean="0"/>
+              <a:t>Seward</a:t>
+            </a:r>
+          </a:p>
+          <a:p>
+            <a:pPr lvl="1"/>
+            <a:r>
+              <a:rPr lang="en-US" smtClean="0"/>
+              <a:t>Harker</a:t>
+            </a:r>
+          </a:p>
+          <a:p>
+            <a:r>
+              <a:rPr lang="en-US" smtClean="0"/>
+              <a:t>Events :</a:t>
+            </a:r>
+          </a:p>
+          <a:p>
+            <a:pPr lvl="1"/>
+            <a:r>
+              <a:rPr lang="en-US" smtClean="0"/>
+              <a:t>Men fight Dracula</a:t>
+            </a:r>
+          </a:p>
+          <a:p>
+            <a:pPr lvl="1"/>
+            <a:r>
+              <a:rPr lang="en-US" smtClean="0"/>
+              <a:t>Van Helsing talks with Mina</a:t>
+            </a:r>
+          </a:p>
+        </p:txBody>
+      </p:sp>
+    </p:spTree>
+    <p:extLst>
+      <p:ext uri="{BB962C8B-B14F-4D97-AF65-F5344CB8AC3E}">
+        <p14:creationId xmlns:p14="http://schemas.microsoft.com/office/powerpoint/2010/main" val="3548929773"/>
+      </p:ext>
+    </p:extLst>
+  </p:cSld>
+  <p:clrMapOvr>
+    <a:masterClrMapping/>
+  </p:clrMapOvr>
+</p:sld>
+</file>
+
+<file path=ppt/slides/slide15.xml><?xml version="1.0" encoding="utf-8"?>
+<p:sld xmlns:a="http://schemas.openxmlformats.org/drawingml/2006/main" xmlns:r="http://schemas.openxmlformats.org/officeDocument/2006/relationships" xmlns:p="http://schemas.openxmlformats.org/presentationml/2006/main">
+  <p:cSld>
+    <p:spTree>
+      <p:nvGrpSpPr>
+        <p:cNvPr id="1" name=""/>
+        <p:cNvGrpSpPr/>
+        <p:nvPr/>
+      </p:nvGrpSpPr>
+      <p:grpSpPr>
+        <a:xfrm>
+          <a:off x="0" y="0"/>
+          <a:ext cx="0" cy="0"/>
+          <a:chOff x="0" y="0"/>
+          <a:chExt cx="0" cy="0"/>
+        </a:xfrm>
+      </p:grpSpPr>
+      <p:sp>
+        <p:nvSpPr>
+          <p:cNvPr id="2" name="Titre 1">
+            <a:extLst>
+              <a:ext uri="{FF2B5EF4-FFF2-40B4-BE49-F238E27FC236}">
+                <a16:creationId xmlns="" xmlns:a16="http://schemas.microsoft.com/office/drawing/2014/main" id="{01FBDD91-A41B-4B21-811F-E25831E8830D}"/>
+              </a:ext>
+            </a:extLst>
+          </p:cNvPr>
+          <p:cNvSpPr>
+            <a:spLocks noGrp="1"/>
+          </p:cNvSpPr>
+          <p:nvPr>
+            <p:ph type="title"/>
+          </p:nvPr>
+        </p:nvSpPr>
+        <p:spPr/>
+        <p:txBody>
+          <a:bodyPr/>
+          <a:lstStyle/>
+          <a:p>
+            <a:r>
+              <a:rPr lang="fr-BE" dirty="0" err="1"/>
+              <a:t>Simplified</a:t>
+            </a:r>
+            <a:r>
+              <a:rPr lang="fr-BE" dirty="0"/>
+              <a:t> </a:t>
+            </a:r>
+            <a:r>
+              <a:rPr lang="fr-BE" dirty="0" err="1"/>
+              <a:t>search</a:t>
+            </a:r>
+            <a:r>
+              <a:rPr lang="fr-BE" dirty="0"/>
+              <a:t> engine </a:t>
+            </a:r>
+          </a:p>
+        </p:txBody>
+      </p:sp>
+      <p:sp>
+        <p:nvSpPr>
+          <p:cNvPr id="3" name="Espace réservé du contenu 2">
+            <a:extLst>
+              <a:ext uri="{FF2B5EF4-FFF2-40B4-BE49-F238E27FC236}">
+                <a16:creationId xmlns="" xmlns:a16="http://schemas.microsoft.com/office/drawing/2014/main" id="{59D9F553-2551-4403-8986-4A7B277CD33B}"/>
+              </a:ext>
+            </a:extLst>
+          </p:cNvPr>
+          <p:cNvSpPr>
+            <a:spLocks noGrp="1"/>
+          </p:cNvSpPr>
+          <p:nvPr>
+            <p:ph idx="1"/>
+          </p:nvPr>
+        </p:nvSpPr>
+        <p:spPr/>
+        <p:txBody>
+          <a:bodyPr/>
+          <a:lstStyle/>
+          <a:p>
+            <a:r>
+              <a:rPr lang="fr-BE" dirty="0" err="1"/>
+              <a:t>Using</a:t>
+            </a:r>
+            <a:r>
+              <a:rPr lang="fr-BE" dirty="0"/>
+              <a:t> </a:t>
+            </a:r>
+            <a:r>
+              <a:rPr lang="fr-BE" dirty="0" err="1"/>
+              <a:t>tf-idf</a:t>
+            </a:r>
+            <a:r>
+              <a:rPr lang="fr-BE" dirty="0"/>
+              <a:t> </a:t>
+            </a:r>
+            <a:r>
+              <a:rPr lang="fr-BE" dirty="0" err="1"/>
+              <a:t>we</a:t>
+            </a:r>
+            <a:r>
+              <a:rPr lang="fr-BE" dirty="0"/>
+              <a:t> </a:t>
+            </a:r>
+            <a:r>
+              <a:rPr lang="fr-BE" dirty="0" err="1"/>
+              <a:t>tried</a:t>
+            </a:r>
+            <a:r>
+              <a:rPr lang="fr-BE" dirty="0"/>
+              <a:t> to </a:t>
+            </a:r>
+            <a:r>
+              <a:rPr lang="fr-BE" dirty="0" err="1"/>
+              <a:t>make</a:t>
+            </a:r>
+            <a:r>
+              <a:rPr lang="fr-BE" dirty="0"/>
+              <a:t> a simple </a:t>
+            </a:r>
+            <a:r>
+              <a:rPr lang="fr-BE" dirty="0" err="1"/>
+              <a:t>search</a:t>
+            </a:r>
+            <a:r>
+              <a:rPr lang="fr-BE" dirty="0"/>
+              <a:t> engine for the book. </a:t>
+            </a:r>
+          </a:p>
+          <a:p>
+            <a:r>
+              <a:rPr lang="fr-BE" dirty="0"/>
+              <a:t>This can </a:t>
+            </a:r>
+            <a:r>
+              <a:rPr lang="fr-BE" dirty="0" err="1"/>
+              <a:t>prove</a:t>
+            </a:r>
+            <a:r>
+              <a:rPr lang="fr-BE" dirty="0"/>
+              <a:t> </a:t>
+            </a:r>
+            <a:r>
+              <a:rPr lang="fr-BE" dirty="0" err="1"/>
+              <a:t>very</a:t>
+            </a:r>
+            <a:r>
+              <a:rPr lang="fr-BE" dirty="0"/>
+              <a:t> </a:t>
+            </a:r>
+            <a:r>
+              <a:rPr lang="fr-BE" dirty="0" err="1"/>
+              <a:t>useful</a:t>
+            </a:r>
+            <a:r>
+              <a:rPr lang="fr-BE" dirty="0"/>
+              <a:t> in case </a:t>
+            </a:r>
+            <a:r>
+              <a:rPr lang="fr-BE" dirty="0" err="1"/>
+              <a:t>you</a:t>
+            </a:r>
+            <a:r>
+              <a:rPr lang="fr-BE" dirty="0"/>
+              <a:t> </a:t>
+            </a:r>
+            <a:r>
+              <a:rPr lang="fr-BE" dirty="0" err="1"/>
+              <a:t>havn’t</a:t>
+            </a:r>
+            <a:r>
+              <a:rPr lang="fr-BE" dirty="0"/>
+              <a:t> </a:t>
+            </a:r>
+            <a:r>
+              <a:rPr lang="fr-BE" dirty="0" err="1"/>
+              <a:t>read</a:t>
+            </a:r>
+            <a:r>
+              <a:rPr lang="fr-BE" dirty="0"/>
+              <a:t> the book and </a:t>
+            </a:r>
+            <a:r>
+              <a:rPr lang="fr-BE" dirty="0" err="1"/>
+              <a:t>want</a:t>
+            </a:r>
+            <a:r>
+              <a:rPr lang="fr-BE" dirty="0"/>
+              <a:t> to </a:t>
+            </a:r>
+            <a:r>
+              <a:rPr lang="fr-BE" dirty="0" err="1"/>
+              <a:t>search</a:t>
+            </a:r>
+            <a:r>
+              <a:rPr lang="fr-BE" dirty="0"/>
+              <a:t> for </a:t>
+            </a:r>
+            <a:r>
+              <a:rPr lang="fr-BE" dirty="0" err="1"/>
+              <a:t>specific</a:t>
+            </a:r>
+            <a:r>
+              <a:rPr lang="fr-BE" dirty="0"/>
+              <a:t> parts. </a:t>
+            </a:r>
+          </a:p>
+          <a:p>
+            <a:r>
+              <a:rPr lang="fr-BE" dirty="0"/>
+              <a:t>Uses </a:t>
+            </a:r>
+            <a:r>
+              <a:rPr lang="fr-BE" dirty="0" err="1"/>
+              <a:t>tfidf</a:t>
+            </a:r>
+            <a:r>
+              <a:rPr lang="fr-BE" dirty="0"/>
+              <a:t> </a:t>
+            </a:r>
+            <a:r>
+              <a:rPr lang="fr-BE" dirty="0" err="1"/>
+              <a:t>cosines</a:t>
+            </a:r>
+            <a:r>
+              <a:rPr lang="fr-BE" dirty="0"/>
+              <a:t> to </a:t>
+            </a:r>
+            <a:r>
+              <a:rPr lang="fr-BE" dirty="0" err="1"/>
+              <a:t>generate</a:t>
+            </a:r>
+            <a:r>
+              <a:rPr lang="fr-BE" dirty="0"/>
+              <a:t> a </a:t>
+            </a:r>
+            <a:r>
+              <a:rPr lang="fr-BE" dirty="0" err="1"/>
+              <a:t>similarity</a:t>
+            </a:r>
+            <a:r>
+              <a:rPr lang="fr-BE" dirty="0"/>
+              <a:t> </a:t>
+            </a:r>
+            <a:r>
+              <a:rPr lang="fr-BE" dirty="0" err="1"/>
+              <a:t>between</a:t>
+            </a:r>
+            <a:r>
+              <a:rPr lang="fr-BE" dirty="0"/>
+              <a:t> </a:t>
+            </a:r>
+            <a:r>
+              <a:rPr lang="fr-BE" dirty="0" err="1"/>
+              <a:t>query</a:t>
+            </a:r>
+            <a:r>
+              <a:rPr lang="fr-BE" dirty="0"/>
+              <a:t> and documents, </a:t>
+            </a:r>
+            <a:r>
+              <a:rPr lang="fr-BE" dirty="0" err="1"/>
+              <a:t>then</a:t>
+            </a:r>
+            <a:r>
+              <a:rPr lang="fr-BE" dirty="0"/>
+              <a:t> return the </a:t>
+            </a:r>
+            <a:r>
+              <a:rPr lang="fr-BE" dirty="0" err="1"/>
+              <a:t>highest</a:t>
+            </a:r>
+            <a:r>
+              <a:rPr lang="fr-BE" dirty="0"/>
+              <a:t> one. </a:t>
+            </a:r>
+          </a:p>
+          <a:p>
+            <a:endParaRPr lang="fr-BE" dirty="0"/>
+          </a:p>
+        </p:txBody>
+      </p:sp>
+      <p:pic>
+        <p:nvPicPr>
+          <p:cNvPr id="5" name="Image 4">
+            <a:extLst>
+              <a:ext uri="{FF2B5EF4-FFF2-40B4-BE49-F238E27FC236}">
+                <a16:creationId xmlns="" xmlns:a16="http://schemas.microsoft.com/office/drawing/2014/main" id="{0B14C756-047D-447F-92C5-EE7DC973CD94}"/>
+              </a:ext>
+            </a:extLst>
+          </p:cNvPr>
+          <p:cNvPicPr>
+            <a:picLocks noChangeAspect="1"/>
+          </p:cNvPicPr>
+          <p:nvPr/>
+        </p:nvPicPr>
+        <p:blipFill>
+          <a:blip r:embed="rId2"/>
+          <a:stretch>
+            <a:fillRect/>
+          </a:stretch>
+        </p:blipFill>
+        <p:spPr>
+          <a:xfrm>
+            <a:off x="2809416" y="4246713"/>
+            <a:ext cx="6573167" cy="2010056"/>
+          </a:xfrm>
+          <a:prstGeom prst="rect">
+            <a:avLst/>
+          </a:prstGeom>
+        </p:spPr>
+      </p:pic>
+    </p:spTree>
+    <p:extLst>
+      <p:ext uri="{BB962C8B-B14F-4D97-AF65-F5344CB8AC3E}">
+        <p14:creationId xmlns:p14="http://schemas.microsoft.com/office/powerpoint/2010/main" val="2237523622"/>
+      </p:ext>
+    </p:extLst>
+  </p:cSld>
+  <p:clrMapOvr>
+    <a:masterClrMapping/>
+  </p:clrMapOvr>
+</p:sld>
+</file>
+
+<file path=ppt/slides/slide16.xml><?xml version="1.0" encoding="utf-8"?>
+<p:sld xmlns:a="http://schemas.openxmlformats.org/drawingml/2006/main" xmlns:r="http://schemas.openxmlformats.org/officeDocument/2006/relationships" xmlns:p="http://schemas.openxmlformats.org/presentationml/2006/main">
+  <p:cSld>
+    <p:spTree>
+      <p:nvGrpSpPr>
+        <p:cNvPr id="1" name=""/>
+        <p:cNvGrpSpPr/>
+        <p:nvPr/>
+      </p:nvGrpSpPr>
+      <p:grpSpPr>
+        <a:xfrm>
+          <a:off x="0" y="0"/>
+          <a:ext cx="0" cy="0"/>
+          <a:chOff x="0" y="0"/>
+          <a:chExt cx="0" cy="0"/>
+        </a:xfrm>
+      </p:grpSpPr>
+      <p:sp>
+        <p:nvSpPr>
+          <p:cNvPr id="2" name="Titre 1">
+            <a:extLst>
+              <a:ext uri="{FF2B5EF4-FFF2-40B4-BE49-F238E27FC236}">
+                <a16:creationId xmlns="" xmlns:a16="http://schemas.microsoft.com/office/drawing/2014/main" id="{C14150E0-2A78-4F7D-BFE7-AE2220A9FF63}"/>
+              </a:ext>
+            </a:extLst>
+          </p:cNvPr>
+          <p:cNvSpPr>
+            <a:spLocks noGrp="1"/>
+          </p:cNvSpPr>
+          <p:nvPr>
+            <p:ph type="title"/>
+          </p:nvPr>
+        </p:nvSpPr>
+        <p:spPr>
+          <a:xfrm>
+            <a:off x="1451579" y="410237"/>
+            <a:ext cx="9291215" cy="1049235"/>
+          </a:xfrm>
+        </p:spPr>
+        <p:txBody>
+          <a:bodyPr/>
+          <a:lstStyle/>
+          <a:p>
+            <a:r>
+              <a:rPr lang="fr-BE" dirty="0"/>
+              <a:t>Tf-</a:t>
+            </a:r>
+            <a:r>
+              <a:rPr lang="fr-BE" dirty="0" err="1"/>
+              <a:t>idf</a:t>
+            </a:r>
+            <a:r>
+              <a:rPr lang="fr-BE" dirty="0"/>
+              <a:t> </a:t>
+            </a:r>
+            <a:r>
+              <a:rPr lang="fr-BE" dirty="0" err="1"/>
+              <a:t>query</a:t>
+            </a:r>
+            <a:r>
+              <a:rPr lang="fr-BE" dirty="0"/>
+              <a:t> exemple</a:t>
+            </a:r>
+          </a:p>
+        </p:txBody>
+      </p:sp>
+      <p:sp>
+        <p:nvSpPr>
+          <p:cNvPr id="3" name="Espace réservé du contenu 2">
+            <a:extLst>
+              <a:ext uri="{FF2B5EF4-FFF2-40B4-BE49-F238E27FC236}">
+                <a16:creationId xmlns="" xmlns:a16="http://schemas.microsoft.com/office/drawing/2014/main" id="{C8D5C7A9-CBCC-4D39-8F63-A1587699988D}"/>
+              </a:ext>
+            </a:extLst>
+          </p:cNvPr>
+          <p:cNvSpPr>
+            <a:spLocks noGrp="1"/>
+          </p:cNvSpPr>
+          <p:nvPr>
+            <p:ph idx="1"/>
+          </p:nvPr>
+        </p:nvSpPr>
+        <p:spPr>
+          <a:xfrm>
+            <a:off x="1451579" y="1394946"/>
+            <a:ext cx="9291215" cy="3450613"/>
+          </a:xfrm>
+        </p:spPr>
+        <p:txBody>
+          <a:bodyPr/>
+          <a:lstStyle/>
+          <a:p>
+            <a:r>
+              <a:rPr lang="en-US" dirty="0"/>
+              <a:t>"I stopped at hotel </a:t>
+            </a:r>
+            <a:r>
+              <a:rPr lang="en-US" dirty="0" err="1"/>
+              <a:t>royale</a:t>
+            </a:r>
+            <a:r>
+              <a:rPr lang="en-US" dirty="0"/>
+              <a:t>, we had a good diner and </a:t>
+            </a:r>
+            <a:r>
+              <a:rPr lang="en-US" dirty="0" err="1"/>
+              <a:t>i</a:t>
+            </a:r>
+            <a:r>
+              <a:rPr lang="en-US" dirty="0"/>
+              <a:t> then visited a museum.“</a:t>
+            </a:r>
+          </a:p>
+          <a:p>
+            <a:r>
+              <a:rPr lang="en-US" dirty="0"/>
+              <a:t>This is about the very beginning of the book so it should return first block</a:t>
+            </a:r>
+            <a:endParaRPr lang="fr-BE" dirty="0"/>
+          </a:p>
+        </p:txBody>
+      </p:sp>
+      <p:pic>
+        <p:nvPicPr>
+          <p:cNvPr id="5" name="Image 4">
+            <a:extLst>
+              <a:ext uri="{FF2B5EF4-FFF2-40B4-BE49-F238E27FC236}">
+                <a16:creationId xmlns="" xmlns:a16="http://schemas.microsoft.com/office/drawing/2014/main" id="{FDA75C6B-C8F6-43AE-88CF-44E620EB32F3}"/>
+              </a:ext>
+            </a:extLst>
+          </p:cNvPr>
+          <p:cNvPicPr>
+            <a:picLocks noChangeAspect="1"/>
+          </p:cNvPicPr>
+          <p:nvPr/>
+        </p:nvPicPr>
+        <p:blipFill>
+          <a:blip r:embed="rId2"/>
+          <a:stretch>
+            <a:fillRect/>
+          </a:stretch>
+        </p:blipFill>
+        <p:spPr>
+          <a:xfrm>
+            <a:off x="1894888" y="2737822"/>
+            <a:ext cx="8402223" cy="3248478"/>
+          </a:xfrm>
+          <a:prstGeom prst="rect">
+            <a:avLst/>
+          </a:prstGeom>
+        </p:spPr>
+      </p:pic>
+    </p:spTree>
+    <p:extLst>
+      <p:ext uri="{BB962C8B-B14F-4D97-AF65-F5344CB8AC3E}">
+        <p14:creationId xmlns:p14="http://schemas.microsoft.com/office/powerpoint/2010/main" val="1234201250"/>
+      </p:ext>
+    </p:extLst>
+  </p:cSld>
+  <p:clrMapOvr>
+    <a:masterClrMapping/>
+  </p:clrMapOvr>
+</p:sld>
+</file>
+
+<file path=ppt/slides/slide17.xml><?xml version="1.0" encoding="utf-8"?>
+<p:sld xmlns:a="http://schemas.openxmlformats.org/drawingml/2006/main" xmlns:r="http://schemas.openxmlformats.org/officeDocument/2006/relationships" xmlns:p="http://schemas.openxmlformats.org/presentationml/2006/main">
+  <p:cSld>
+    <p:spTree>
+      <p:nvGrpSpPr>
+        <p:cNvPr id="1" name=""/>
+        <p:cNvGrpSpPr/>
+        <p:nvPr/>
+      </p:nvGrpSpPr>
+      <p:grpSpPr>
+        <a:xfrm>
+          <a:off x="0" y="0"/>
+          <a:ext cx="0" cy="0"/>
+          <a:chOff x="0" y="0"/>
+          <a:chExt cx="0" cy="0"/>
+        </a:xfrm>
+      </p:grpSpPr>
+      <p:sp>
+        <p:nvSpPr>
+          <p:cNvPr id="2" name="Titre 1">
+            <a:extLst>
+              <a:ext uri="{FF2B5EF4-FFF2-40B4-BE49-F238E27FC236}">
+                <a16:creationId xmlns="" xmlns:a16="http://schemas.microsoft.com/office/drawing/2014/main" id="{A093F50F-C593-40A9-95E7-FFE1F76D3966}"/>
+              </a:ext>
+            </a:extLst>
+          </p:cNvPr>
+          <p:cNvSpPr>
+            <a:spLocks noGrp="1"/>
+          </p:cNvSpPr>
+          <p:nvPr>
+            <p:ph type="title"/>
+          </p:nvPr>
+        </p:nvSpPr>
+        <p:spPr>
+          <a:xfrm>
+            <a:off x="1451579" y="443274"/>
+            <a:ext cx="9291215" cy="1049235"/>
+          </a:xfrm>
+        </p:spPr>
+        <p:txBody>
+          <a:bodyPr/>
+          <a:lstStyle/>
+          <a:p>
+            <a:r>
+              <a:rPr lang="fr-BE" smtClean="0"/>
+              <a:t>Conclusion</a:t>
+            </a:r>
+            <a:endParaRPr lang="fr-BE"/>
+          </a:p>
+        </p:txBody>
+      </p:sp>
+      <p:sp>
+        <p:nvSpPr>
+          <p:cNvPr id="3" name="Espace réservé du contenu 2">
+            <a:extLst>
+              <a:ext uri="{FF2B5EF4-FFF2-40B4-BE49-F238E27FC236}">
+                <a16:creationId xmlns="" xmlns:a16="http://schemas.microsoft.com/office/drawing/2014/main" id="{1A485B1E-6CDE-46C3-9E2C-1F013AFAAE45}"/>
+              </a:ext>
+            </a:extLst>
+          </p:cNvPr>
+          <p:cNvSpPr>
+            <a:spLocks noGrp="1"/>
+          </p:cNvSpPr>
+          <p:nvPr>
+            <p:ph idx="1"/>
+          </p:nvPr>
+        </p:nvSpPr>
+        <p:spPr>
+          <a:xfrm>
+            <a:off x="1451579" y="1444976"/>
+            <a:ext cx="9291215" cy="4481689"/>
+          </a:xfrm>
+        </p:spPr>
+        <p:txBody>
+          <a:bodyPr>
+            <a:normAutofit/>
+          </a:bodyPr>
+          <a:lstStyle/>
+          <a:p>
+            <a:pPr marL="0" indent="0">
+              <a:buNone/>
+            </a:pPr>
+            <a:r>
+              <a:rPr lang="fr-BE" b="1" smtClean="0"/>
+              <a:t>LIMITS</a:t>
+            </a:r>
+            <a:endParaRPr lang="fr-BE" b="1"/>
+          </a:p>
+          <a:p>
+            <a:r>
+              <a:rPr lang="en-US" smtClean="0"/>
+              <a:t>Item</a:t>
+            </a:r>
+          </a:p>
+        </p:txBody>
+      </p:sp>
+    </p:spTree>
+    <p:extLst>
+      <p:ext uri="{BB962C8B-B14F-4D97-AF65-F5344CB8AC3E}">
+        <p14:creationId xmlns:p14="http://schemas.microsoft.com/office/powerpoint/2010/main" val="855028033"/>
+      </p:ext>
+    </p:extLst>
+  </p:cSld>
+  <p:clrMapOvr>
+    <a:masterClrMapping/>
+  </p:clrMapOvr>
+</p:sld>
+</file>
+
+<file path=ppt/slides/slide18.xml><?xml version="1.0" encoding="utf-8"?>
+<p:sld xmlns:a="http://schemas.openxmlformats.org/drawingml/2006/main" xmlns:r="http://schemas.openxmlformats.org/officeDocument/2006/relationships" xmlns:p="http://schemas.openxmlformats.org/presentationml/2006/main">
+  <p:cSld>
+    <p:spTree>
+      <p:nvGrpSpPr>
+        <p:cNvPr id="1" name=""/>
+        <p:cNvGrpSpPr/>
+        <p:nvPr/>
+      </p:nvGrpSpPr>
+      <p:grpSpPr>
+        <a:xfrm>
+          <a:off x="0" y="0"/>
+          <a:ext cx="0" cy="0"/>
+          <a:chOff x="0" y="0"/>
+          <a:chExt cx="0" cy="0"/>
+        </a:xfrm>
+      </p:grpSpPr>
+      <p:sp>
+        <p:nvSpPr>
+          <p:cNvPr id="2" name="Titre 1">
+            <a:extLst>
+              <a:ext uri="{FF2B5EF4-FFF2-40B4-BE49-F238E27FC236}">
+                <a16:creationId xmlns="" xmlns:a16="http://schemas.microsoft.com/office/drawing/2014/main" id="{A093F50F-C593-40A9-95E7-FFE1F76D3966}"/>
+              </a:ext>
+            </a:extLst>
+          </p:cNvPr>
+          <p:cNvSpPr>
+            <a:spLocks noGrp="1"/>
+          </p:cNvSpPr>
+          <p:nvPr>
+            <p:ph type="title"/>
+          </p:nvPr>
+        </p:nvSpPr>
+        <p:spPr>
+          <a:xfrm>
+            <a:off x="1451579" y="443274"/>
+            <a:ext cx="9291215" cy="1049235"/>
+          </a:xfrm>
+        </p:spPr>
+        <p:txBody>
+          <a:bodyPr/>
+          <a:lstStyle/>
+          <a:p>
+            <a:r>
+              <a:rPr lang="fr-BE" smtClean="0"/>
+              <a:t>Conclusion</a:t>
+            </a:r>
+            <a:endParaRPr lang="fr-BE"/>
+          </a:p>
+        </p:txBody>
+      </p:sp>
+      <p:sp>
+        <p:nvSpPr>
+          <p:cNvPr id="3" name="Espace réservé du contenu 2">
+            <a:extLst>
+              <a:ext uri="{FF2B5EF4-FFF2-40B4-BE49-F238E27FC236}">
+                <a16:creationId xmlns="" xmlns:a16="http://schemas.microsoft.com/office/drawing/2014/main" id="{1A485B1E-6CDE-46C3-9E2C-1F013AFAAE45}"/>
+              </a:ext>
+            </a:extLst>
+          </p:cNvPr>
+          <p:cNvSpPr>
+            <a:spLocks noGrp="1"/>
+          </p:cNvSpPr>
+          <p:nvPr>
+            <p:ph idx="1"/>
+          </p:nvPr>
+        </p:nvSpPr>
+        <p:spPr>
+          <a:xfrm>
+            <a:off x="1451579" y="1444976"/>
+            <a:ext cx="9291215" cy="4481689"/>
+          </a:xfrm>
+        </p:spPr>
+        <p:txBody>
+          <a:bodyPr>
+            <a:normAutofit/>
+          </a:bodyPr>
+          <a:lstStyle/>
+          <a:p>
+            <a:pPr marL="0" indent="0">
+              <a:buNone/>
+            </a:pPr>
+            <a:r>
+              <a:rPr lang="fr-BE" b="1" smtClean="0"/>
+              <a:t>ETHICAL ASPECTS</a:t>
+            </a:r>
+            <a:endParaRPr lang="fr-BE" b="1"/>
+          </a:p>
+          <a:p>
+            <a:r>
+              <a:rPr lang="en-US" smtClean="0"/>
+              <a:t>Item</a:t>
+            </a:r>
+          </a:p>
+        </p:txBody>
+      </p:sp>
+    </p:spTree>
+    <p:extLst>
+      <p:ext uri="{BB962C8B-B14F-4D97-AF65-F5344CB8AC3E}">
+        <p14:creationId xmlns:p14="http://schemas.microsoft.com/office/powerpoint/2010/main" val="2417756305"/>
       </p:ext>
     </p:extLst>
   </p:cSld>
@@ -3666,7 +5192,7 @@
           <p:cNvPr id="2" name="Titre 1">
             <a:extLst>
               <a:ext uri="{FF2B5EF4-FFF2-40B4-BE49-F238E27FC236}">
-                <a16:creationId xmlns:a16="http://schemas.microsoft.com/office/drawing/2014/main" xmlns="" id="{1B0421F2-61B6-48A3-9B08-0D565C5DE0FF}"/>
+                <a16:creationId xmlns="" xmlns:a16="http://schemas.microsoft.com/office/drawing/2014/main" id="{A093F50F-C593-40A9-95E7-FFE1F76D3966}"/>
               </a:ext>
             </a:extLst>
           </p:cNvPr>
@@ -3683,18 +5209,10 @@
           <a:lstStyle/>
           <a:p>
             <a:r>
-              <a:rPr lang="fr-BE" dirty="0" err="1"/>
-              <a:t>Text</a:t>
-            </a:r>
-            <a:r>
-              <a:rPr lang="fr-BE" dirty="0"/>
-              <a:t> </a:t>
-            </a:r>
-            <a:r>
-              <a:rPr lang="fr-BE" dirty="0" err="1"/>
-              <a:t>pre-processing</a:t>
-            </a:r>
-            <a:endParaRPr lang="fr-BE" dirty="0"/>
+              <a:rPr lang="fr-BE" smtClean="0"/>
+              <a:t>Introduction</a:t>
+            </a:r>
+            <a:endParaRPr lang="fr-BE"/>
           </a:p>
         </p:txBody>
       </p:sp>
@@ -3703,7 +5221,7 @@
           <p:cNvPr id="3" name="Espace réservé du contenu 2">
             <a:extLst>
               <a:ext uri="{FF2B5EF4-FFF2-40B4-BE49-F238E27FC236}">
-                <a16:creationId xmlns:a16="http://schemas.microsoft.com/office/drawing/2014/main" xmlns="" id="{26C0DD74-2A72-4E31-BCBE-C3917A21439F}"/>
+                <a16:creationId xmlns="" xmlns:a16="http://schemas.microsoft.com/office/drawing/2014/main" id="{1A485B1E-6CDE-46C3-9E2C-1F013AFAAE45}"/>
               </a:ext>
             </a:extLst>
           </p:cNvPr>
@@ -3720,165 +5238,51 @@
           <a:lstStyle/>
           <a:p>
             <a:r>
-              <a:rPr lang="fr-BE" dirty="0" err="1"/>
-              <a:t>Only</a:t>
-            </a:r>
-            <a:r>
-              <a:rPr lang="fr-BE" dirty="0"/>
-              <a:t> </a:t>
-            </a:r>
-            <a:r>
-              <a:rPr lang="fr-BE" dirty="0" err="1"/>
-              <a:t>keep</a:t>
-            </a:r>
-            <a:r>
-              <a:rPr lang="fr-BE" dirty="0"/>
-              <a:t> </a:t>
-            </a:r>
-            <a:r>
-              <a:rPr lang="fr-BE" dirty="0" err="1"/>
-              <a:t>chapters</a:t>
-            </a:r>
-            <a:r>
-              <a:rPr lang="fr-BE" dirty="0"/>
-              <a:t> in the txt file. (</a:t>
-            </a:r>
-            <a:r>
-              <a:rPr lang="fr-BE" dirty="0" err="1"/>
-              <a:t>Remove</a:t>
-            </a:r>
-            <a:r>
-              <a:rPr lang="fr-BE" dirty="0"/>
-              <a:t> </a:t>
-            </a:r>
-            <a:r>
-              <a:rPr lang="fr-BE" dirty="0" err="1"/>
-              <a:t>unnecessary</a:t>
-            </a:r>
-            <a:r>
-              <a:rPr lang="fr-BE" dirty="0"/>
-              <a:t> parts </a:t>
-            </a:r>
-            <a:r>
-              <a:rPr lang="fr-BE" dirty="0" err="1"/>
-              <a:t>before</a:t>
-            </a:r>
-            <a:r>
-              <a:rPr lang="fr-BE" dirty="0"/>
-              <a:t> and </a:t>
-            </a:r>
-            <a:r>
-              <a:rPr lang="fr-BE" dirty="0" err="1"/>
-              <a:t>after</a:t>
-            </a:r>
-            <a:r>
-              <a:rPr lang="fr-BE" dirty="0"/>
-              <a:t> the book)</a:t>
-            </a:r>
-          </a:p>
-          <a:p>
-            <a:r>
-              <a:rPr lang="fr-BE" dirty="0"/>
-              <a:t>Divisions : </a:t>
-            </a:r>
-            <a:r>
-              <a:rPr lang="fr-BE" dirty="0" err="1"/>
-              <a:t>Chapters</a:t>
-            </a:r>
-            <a:r>
-              <a:rPr lang="fr-BE" dirty="0"/>
-              <a:t>/N sentences</a:t>
-            </a:r>
-          </a:p>
-          <a:p>
-            <a:r>
-              <a:rPr lang="fr-BE" dirty="0" err="1"/>
-              <a:t>Lowercase</a:t>
-            </a:r>
-            <a:r>
-              <a:rPr lang="fr-BE" dirty="0"/>
-              <a:t> </a:t>
-            </a:r>
-          </a:p>
-          <a:p>
-            <a:r>
-              <a:rPr lang="fr-BE" dirty="0" err="1"/>
-              <a:t>Remove</a:t>
-            </a:r>
-            <a:r>
-              <a:rPr lang="fr-BE" dirty="0"/>
-              <a:t> </a:t>
-            </a:r>
-            <a:r>
-              <a:rPr lang="fr-BE" dirty="0" err="1"/>
-              <a:t>punctuation</a:t>
-            </a:r>
-            <a:r>
-              <a:rPr lang="fr-BE" dirty="0"/>
-              <a:t> and </a:t>
-            </a:r>
-            <a:r>
-              <a:rPr lang="fr-BE" dirty="0" err="1"/>
-              <a:t>special</a:t>
-            </a:r>
-            <a:r>
-              <a:rPr lang="fr-BE" dirty="0"/>
-              <a:t> </a:t>
-            </a:r>
-            <a:r>
-              <a:rPr lang="fr-BE" dirty="0" err="1"/>
-              <a:t>characters</a:t>
-            </a:r>
-            <a:r>
-              <a:rPr lang="fr-BE" dirty="0"/>
-              <a:t> </a:t>
-            </a:r>
-          </a:p>
-          <a:p>
-            <a:r>
-              <a:rPr lang="fr-BE" dirty="0" err="1"/>
-              <a:t>Stemming</a:t>
-            </a:r>
-            <a:r>
-              <a:rPr lang="fr-BE" dirty="0"/>
-              <a:t> of the </a:t>
-            </a:r>
-            <a:r>
-              <a:rPr lang="fr-BE" dirty="0" err="1"/>
-              <a:t>words</a:t>
-            </a:r>
-            <a:r>
-              <a:rPr lang="fr-BE" dirty="0"/>
-              <a:t> : </a:t>
-            </a:r>
-            <a:r>
-              <a:rPr lang="fr-BE" dirty="0" err="1"/>
-              <a:t>reduce</a:t>
-            </a:r>
-            <a:r>
-              <a:rPr lang="fr-BE" dirty="0"/>
-              <a:t> to </a:t>
-            </a:r>
-            <a:r>
-              <a:rPr lang="fr-BE" dirty="0" err="1"/>
-              <a:t>its</a:t>
-            </a:r>
-            <a:r>
-              <a:rPr lang="fr-BE" dirty="0"/>
-              <a:t> root </a:t>
-            </a:r>
-            <a:r>
-              <a:rPr lang="fr-BE" dirty="0" err="1"/>
-              <a:t>form</a:t>
-            </a:r>
-            <a:endParaRPr lang="fr-BE" dirty="0"/>
+              <a:rPr lang="fr-BE"/>
+              <a:t>Dracula : a masterpiece novel of the gothic horror genre</a:t>
+            </a:r>
+          </a:p>
+          <a:p>
+            <a:r>
+              <a:rPr lang="fr-BE"/>
+              <a:t>Synopsis : a perfect couple</a:t>
+            </a:r>
+            <a:r>
+              <a:rPr lang="fr-BE"/>
+              <a:t>, </a:t>
+            </a:r>
+            <a:r>
+              <a:rPr lang="fr-BE" smtClean="0"/>
+              <a:t>some soldiers and scientists, and a </a:t>
+            </a:r>
+            <a:r>
+              <a:rPr lang="fr-BE"/>
+              <a:t>malevolent </a:t>
+            </a:r>
+            <a:r>
+              <a:rPr lang="fr-BE" smtClean="0"/>
+              <a:t>tourist</a:t>
+            </a:r>
+          </a:p>
+          <a:p>
+            <a:r>
+              <a:rPr lang="fr-BE" smtClean="0"/>
+              <a:t>An epistolary style</a:t>
+            </a:r>
+          </a:p>
+          <a:p>
+            <a:r>
+              <a:rPr lang="fr-BE" smtClean="0"/>
+              <a:t>Reasons for this choice </a:t>
+            </a:r>
+            <a:endParaRPr lang="fr-BE"/>
           </a:p>
         </p:txBody>
       </p:sp>
     </p:spTree>
     <p:extLst>
       <p:ext uri="{BB962C8B-B14F-4D97-AF65-F5344CB8AC3E}">
-        <p14:creationId xmlns:p14="http://schemas.microsoft.com/office/powerpoint/2010/main" val="3193662148"/>
+        <p14:creationId xmlns:p14="http://schemas.microsoft.com/office/powerpoint/2010/main" val="2156111385"/>
       </p:ext>
     </p:extLst>
   </p:cSld>
@@ -3910,7 +5314,7 @@
           <p:cNvPr id="2" name="Titre 1">
             <a:extLst>
               <a:ext uri="{FF2B5EF4-FFF2-40B4-BE49-F238E27FC236}">
-                <a16:creationId xmlns:a16="http://schemas.microsoft.com/office/drawing/2014/main" xmlns="" id="{49C4B582-E099-4FC5-9479-E8A169D73731}"/>
+                <a16:creationId xmlns="" xmlns:a16="http://schemas.microsoft.com/office/drawing/2014/main" id="{A093F50F-C593-40A9-95E7-FFE1F76D3966}"/>
               </a:ext>
             </a:extLst>
           </p:cNvPr>
@@ -3927,9 +5331,10 @@
           <a:lstStyle/>
           <a:p>
             <a:r>
-              <a:rPr lang="fr-BE" dirty="0"/>
-              <a:t>Topic Extraction </a:t>
-            </a:r>
+              <a:rPr lang="fr-BE" smtClean="0"/>
+              <a:t>Introduction</a:t>
+            </a:r>
+            <a:endParaRPr lang="fr-BE"/>
           </a:p>
         </p:txBody>
       </p:sp>
@@ -3938,7 +5343,7 @@
           <p:cNvPr id="3" name="Espace réservé du contenu 2">
             <a:extLst>
               <a:ext uri="{FF2B5EF4-FFF2-40B4-BE49-F238E27FC236}">
-                <a16:creationId xmlns:a16="http://schemas.microsoft.com/office/drawing/2014/main" xmlns="" id="{C03B7812-397A-41A8-BF52-A6504BE74B37}"/>
+                <a16:creationId xmlns="" xmlns:a16="http://schemas.microsoft.com/office/drawing/2014/main" id="{1A485B1E-6CDE-46C3-9E2C-1F013AFAAE45}"/>
               </a:ext>
             </a:extLst>
           </p:cNvPr>
@@ -3951,110 +5356,67 @@
         </p:nvSpPr>
         <p:spPr/>
         <p:txBody>
-          <a:bodyPr/>
-          <a:lstStyle/>
-          <a:p>
-            <a:r>
-              <a:rPr lang="fr-BE" dirty="0"/>
-              <a:t>First </a:t>
-            </a:r>
-            <a:r>
-              <a:rPr lang="fr-BE" dirty="0" err="1"/>
-              <a:t>extract</a:t>
-            </a:r>
-            <a:r>
-              <a:rPr lang="fr-BE" dirty="0"/>
-              <a:t> topics for all </a:t>
-            </a:r>
-            <a:r>
-              <a:rPr lang="fr-BE" dirty="0" err="1"/>
-              <a:t>chapters</a:t>
-            </a:r>
-            <a:r>
-              <a:rPr lang="fr-BE" dirty="0"/>
-              <a:t> </a:t>
-            </a:r>
-          </a:p>
-          <a:p>
-            <a:r>
-              <a:rPr lang="fr-BE" dirty="0" err="1"/>
-              <a:t>Then</a:t>
-            </a:r>
-            <a:r>
-              <a:rPr lang="fr-BE" dirty="0"/>
-              <a:t> </a:t>
-            </a:r>
-            <a:r>
-              <a:rPr lang="fr-BE" dirty="0" err="1"/>
-              <a:t>extract</a:t>
-            </a:r>
-            <a:r>
-              <a:rPr lang="fr-BE" dirty="0"/>
-              <a:t> one topic </a:t>
-            </a:r>
-            <a:r>
-              <a:rPr lang="fr-BE" dirty="0" err="1"/>
-              <a:t>from</a:t>
-            </a:r>
-            <a:r>
-              <a:rPr lang="fr-BE" dirty="0"/>
-              <a:t> </a:t>
-            </a:r>
-            <a:r>
-              <a:rPr lang="fr-BE" dirty="0" err="1"/>
-              <a:t>each</a:t>
-            </a:r>
-            <a:r>
-              <a:rPr lang="fr-BE" dirty="0"/>
-              <a:t> </a:t>
-            </a:r>
-            <a:r>
-              <a:rPr lang="fr-BE" dirty="0" err="1"/>
-              <a:t>chapter</a:t>
-            </a:r>
-            <a:r>
-              <a:rPr lang="fr-BE" dirty="0"/>
-              <a:t>, </a:t>
-            </a:r>
-            <a:r>
-              <a:rPr lang="fr-BE" dirty="0" err="1"/>
-              <a:t>trying</a:t>
-            </a:r>
-            <a:r>
-              <a:rPr lang="fr-BE" dirty="0"/>
-              <a:t> to </a:t>
-            </a:r>
-            <a:r>
-              <a:rPr lang="fr-BE" dirty="0" err="1"/>
-              <a:t>get</a:t>
-            </a:r>
-            <a:r>
-              <a:rPr lang="fr-BE" dirty="0"/>
-              <a:t> the </a:t>
-            </a:r>
-            <a:r>
-              <a:rPr lang="fr-BE" dirty="0" err="1"/>
-              <a:t>differences</a:t>
-            </a:r>
-            <a:r>
-              <a:rPr lang="fr-BE" dirty="0"/>
-              <a:t> in topics and </a:t>
-            </a:r>
-            <a:r>
-              <a:rPr lang="fr-BE" dirty="0" err="1"/>
-              <a:t>see</a:t>
-            </a:r>
-            <a:r>
-              <a:rPr lang="fr-BE" dirty="0"/>
-              <a:t> the story progression</a:t>
-            </a:r>
+          <a:bodyPr>
+            <a:normAutofit fontScale="92500" lnSpcReduction="10000"/>
+          </a:bodyPr>
+          <a:lstStyle/>
+          <a:p>
+            <a:r>
+              <a:rPr lang="fr-BE" smtClean="0"/>
+              <a:t>Text preprocessing</a:t>
+            </a:r>
+          </a:p>
+          <a:p>
+            <a:r>
+              <a:rPr lang="fr-BE" smtClean="0"/>
+              <a:t>Topic extraction:</a:t>
+            </a:r>
+          </a:p>
+          <a:p>
+            <a:pPr lvl="1"/>
+            <a:r>
+              <a:rPr lang="fr-BE" smtClean="0"/>
+              <a:t>LDA</a:t>
+            </a:r>
+          </a:p>
+          <a:p>
+            <a:pPr lvl="1"/>
+            <a:r>
+              <a:rPr lang="fr-BE" smtClean="0"/>
+              <a:t>NMF</a:t>
+            </a:r>
+          </a:p>
+          <a:p>
+            <a:r>
+              <a:rPr lang="fr-BE" smtClean="0"/>
+              <a:t>Relationships graph</a:t>
+            </a:r>
+          </a:p>
+          <a:p>
+            <a:r>
+              <a:rPr lang="fr-BE" smtClean="0"/>
+              <a:t>Frequent itemsets</a:t>
+            </a:r>
+          </a:p>
+          <a:p>
+            <a:r>
+              <a:rPr lang="fr-BE" smtClean="0"/>
+              <a:t>Bonus : a search engine</a:t>
+            </a:r>
+          </a:p>
+          <a:p>
+            <a:r>
+              <a:rPr lang="fr-BE" smtClean="0"/>
+              <a:t>Conclusion</a:t>
+            </a:r>
+            <a:endParaRPr lang="fr-BE"/>
           </a:p>
         </p:txBody>
       </p:sp>
     </p:spTree>
     <p:extLst>
       <p:ext uri="{BB962C8B-B14F-4D97-AF65-F5344CB8AC3E}">
-        <p14:creationId xmlns:p14="http://schemas.microsoft.com/office/powerpoint/2010/main" val="2616280591"/>
+        <p14:creationId xmlns:p14="http://schemas.microsoft.com/office/powerpoint/2010/main" val="28142544"/>
       </p:ext>
     </p:extLst>
   </p:cSld>
@@ -4086,7 +5448,427 @@
           <p:cNvPr id="2" name="Titre 1">
             <a:extLst>
               <a:ext uri="{FF2B5EF4-FFF2-40B4-BE49-F238E27FC236}">
-                <a16:creationId xmlns:a16="http://schemas.microsoft.com/office/drawing/2014/main" xmlns="" id="{F2477979-5622-459C-B989-5A4097664795}"/>
+                <a16:creationId xmlns="" xmlns:a16="http://schemas.microsoft.com/office/drawing/2014/main" id="{1B0421F2-61B6-48A3-9B08-0D565C5DE0FF}"/>
+              </a:ext>
+            </a:extLst>
+          </p:cNvPr>
+          <p:cNvSpPr>
+            <a:spLocks noGrp="1"/>
+          </p:cNvSpPr>
+          <p:nvPr>
+            <p:ph type="title"/>
+          </p:nvPr>
+        </p:nvSpPr>
+        <p:spPr/>
+        <p:txBody>
+          <a:bodyPr/>
+          <a:lstStyle/>
+          <a:p>
+            <a:r>
+              <a:rPr lang="fr-BE" dirty="0" err="1"/>
+              <a:t>Text</a:t>
+            </a:r>
+            <a:r>
+              <a:rPr lang="fr-BE" dirty="0"/>
+              <a:t> </a:t>
+            </a:r>
+            <a:r>
+              <a:rPr lang="fr-BE" dirty="0" err="1"/>
+              <a:t>pre-processing</a:t>
+            </a:r>
+            <a:endParaRPr lang="fr-BE" dirty="0"/>
+          </a:p>
+        </p:txBody>
+      </p:sp>
+      <p:sp>
+        <p:nvSpPr>
+          <p:cNvPr id="3" name="Espace réservé du contenu 2">
+            <a:extLst>
+              <a:ext uri="{FF2B5EF4-FFF2-40B4-BE49-F238E27FC236}">
+                <a16:creationId xmlns="" xmlns:a16="http://schemas.microsoft.com/office/drawing/2014/main" id="{26C0DD74-2A72-4E31-BCBE-C3917A21439F}"/>
+              </a:ext>
+            </a:extLst>
+          </p:cNvPr>
+          <p:cNvSpPr>
+            <a:spLocks noGrp="1"/>
+          </p:cNvSpPr>
+          <p:nvPr>
+            <p:ph idx="1"/>
+          </p:nvPr>
+        </p:nvSpPr>
+        <p:spPr/>
+        <p:txBody>
+          <a:bodyPr/>
+          <a:lstStyle/>
+          <a:p>
+            <a:r>
+              <a:rPr lang="fr-BE" dirty="0" err="1"/>
+              <a:t>Only</a:t>
+            </a:r>
+            <a:r>
+              <a:rPr lang="fr-BE" dirty="0"/>
+              <a:t> </a:t>
+            </a:r>
+            <a:r>
+              <a:rPr lang="fr-BE" dirty="0" err="1"/>
+              <a:t>keep</a:t>
+            </a:r>
+            <a:r>
+              <a:rPr lang="fr-BE" dirty="0"/>
+              <a:t> </a:t>
+            </a:r>
+            <a:r>
+              <a:rPr lang="fr-BE" dirty="0" err="1"/>
+              <a:t>chapters</a:t>
+            </a:r>
+            <a:r>
+              <a:rPr lang="fr-BE" dirty="0"/>
+              <a:t> in the txt file. (</a:t>
+            </a:r>
+            <a:r>
+              <a:rPr lang="fr-BE" dirty="0" err="1"/>
+              <a:t>Remove</a:t>
+            </a:r>
+            <a:r>
+              <a:rPr lang="fr-BE" dirty="0"/>
+              <a:t> </a:t>
+            </a:r>
+            <a:r>
+              <a:rPr lang="fr-BE" dirty="0" err="1"/>
+              <a:t>unnecessary</a:t>
+            </a:r>
+            <a:r>
+              <a:rPr lang="fr-BE" dirty="0"/>
+              <a:t> parts </a:t>
+            </a:r>
+            <a:r>
+              <a:rPr lang="fr-BE" dirty="0" err="1"/>
+              <a:t>before</a:t>
+            </a:r>
+            <a:r>
+              <a:rPr lang="fr-BE" dirty="0"/>
+              <a:t> and </a:t>
+            </a:r>
+            <a:r>
+              <a:rPr lang="fr-BE" dirty="0" err="1"/>
+              <a:t>after</a:t>
+            </a:r>
+            <a:r>
+              <a:rPr lang="fr-BE" dirty="0"/>
+              <a:t> the book)</a:t>
+            </a:r>
+          </a:p>
+          <a:p>
+            <a:r>
+              <a:rPr lang="fr-BE" dirty="0"/>
+              <a:t>Divisions : </a:t>
+            </a:r>
+            <a:r>
+              <a:rPr lang="fr-BE" dirty="0" err="1"/>
+              <a:t>Chapters</a:t>
+            </a:r>
+            <a:r>
+              <a:rPr lang="fr-BE" dirty="0"/>
+              <a:t>/N sentences</a:t>
+            </a:r>
+          </a:p>
+          <a:p>
+            <a:r>
+              <a:rPr lang="fr-BE" dirty="0" err="1"/>
+              <a:t>Lowercase</a:t>
+            </a:r>
+            <a:r>
+              <a:rPr lang="fr-BE" dirty="0"/>
+              <a:t> </a:t>
+            </a:r>
+          </a:p>
+          <a:p>
+            <a:r>
+              <a:rPr lang="fr-BE" dirty="0" err="1"/>
+              <a:t>Remove</a:t>
+            </a:r>
+            <a:r>
+              <a:rPr lang="fr-BE" dirty="0"/>
+              <a:t> </a:t>
+            </a:r>
+            <a:r>
+              <a:rPr lang="fr-BE" dirty="0" err="1"/>
+              <a:t>punctuation</a:t>
+            </a:r>
+            <a:r>
+              <a:rPr lang="fr-BE" dirty="0"/>
+              <a:t> and </a:t>
+            </a:r>
+            <a:r>
+              <a:rPr lang="fr-BE" dirty="0" err="1"/>
+              <a:t>special</a:t>
+            </a:r>
+            <a:r>
+              <a:rPr lang="fr-BE" dirty="0"/>
+              <a:t> </a:t>
+            </a:r>
+            <a:r>
+              <a:rPr lang="fr-BE" dirty="0" err="1"/>
+              <a:t>characters</a:t>
+            </a:r>
+            <a:r>
+              <a:rPr lang="fr-BE" dirty="0"/>
+              <a:t> </a:t>
+            </a:r>
+          </a:p>
+          <a:p>
+            <a:r>
+              <a:rPr lang="fr-BE" dirty="0" err="1"/>
+              <a:t>Stemming</a:t>
+            </a:r>
+            <a:r>
+              <a:rPr lang="fr-BE" dirty="0"/>
+              <a:t> of the </a:t>
+            </a:r>
+            <a:r>
+              <a:rPr lang="fr-BE" dirty="0" err="1"/>
+              <a:t>words</a:t>
+            </a:r>
+            <a:r>
+              <a:rPr lang="fr-BE" dirty="0"/>
+              <a:t> : </a:t>
+            </a:r>
+            <a:r>
+              <a:rPr lang="fr-BE" dirty="0" err="1"/>
+              <a:t>reduce</a:t>
+            </a:r>
+            <a:r>
+              <a:rPr lang="fr-BE" dirty="0"/>
+              <a:t> to </a:t>
+            </a:r>
+            <a:r>
+              <a:rPr lang="fr-BE" dirty="0" err="1"/>
+              <a:t>its</a:t>
+            </a:r>
+            <a:r>
+              <a:rPr lang="fr-BE" dirty="0"/>
+              <a:t> root </a:t>
+            </a:r>
+            <a:r>
+              <a:rPr lang="fr-BE" dirty="0" err="1"/>
+              <a:t>form</a:t>
+            </a:r>
+            <a:endParaRPr lang="fr-BE" dirty="0"/>
+          </a:p>
+        </p:txBody>
+      </p:sp>
+    </p:spTree>
+    <p:extLst>
+      <p:ext uri="{BB962C8B-B14F-4D97-AF65-F5344CB8AC3E}">
+        <p14:creationId xmlns:p14="http://schemas.microsoft.com/office/powerpoint/2010/main" val="3193662148"/>
+      </p:ext>
+    </p:extLst>
+  </p:cSld>
+  <p:clrMapOvr>
+    <a:masterClrMapping/>
+  </p:clrMapOvr>
+</p:sld>
+</file>
+
+<file path=ppt/slides/slide5.xml><?xml version="1.0" encoding="utf-8"?>
+<p:sld xmlns:a="http://schemas.openxmlformats.org/drawingml/2006/main" xmlns:r="http://schemas.openxmlformats.org/officeDocument/2006/relationships" xmlns:p="http://schemas.openxmlformats.org/presentationml/2006/main">
+  <p:cSld>
+    <p:spTree>
+      <p:nvGrpSpPr>
+        <p:cNvPr id="1" name=""/>
+        <p:cNvGrpSpPr/>
+        <p:nvPr/>
+      </p:nvGrpSpPr>
+      <p:grpSpPr>
+        <a:xfrm>
+          <a:off x="0" y="0"/>
+          <a:ext cx="0" cy="0"/>
+          <a:chOff x="0" y="0"/>
+          <a:chExt cx="0" cy="0"/>
+        </a:xfrm>
+      </p:grpSpPr>
+      <p:sp>
+        <p:nvSpPr>
+          <p:cNvPr id="2" name="Titre 1">
+            <a:extLst>
+              <a:ext uri="{FF2B5EF4-FFF2-40B4-BE49-F238E27FC236}">
+                <a16:creationId xmlns="" xmlns:a16="http://schemas.microsoft.com/office/drawing/2014/main" id="{49C4B582-E099-4FC5-9479-E8A169D73731}"/>
+              </a:ext>
+            </a:extLst>
+          </p:cNvPr>
+          <p:cNvSpPr>
+            <a:spLocks noGrp="1"/>
+          </p:cNvSpPr>
+          <p:nvPr>
+            <p:ph type="title"/>
+          </p:nvPr>
+        </p:nvSpPr>
+        <p:spPr/>
+        <p:txBody>
+          <a:bodyPr/>
+          <a:lstStyle/>
+          <a:p>
+            <a:r>
+              <a:rPr lang="fr-BE" dirty="0"/>
+              <a:t>Topic Extraction </a:t>
+            </a:r>
+          </a:p>
+        </p:txBody>
+      </p:sp>
+      <p:sp>
+        <p:nvSpPr>
+          <p:cNvPr id="3" name="Espace réservé du contenu 2">
+            <a:extLst>
+              <a:ext uri="{FF2B5EF4-FFF2-40B4-BE49-F238E27FC236}">
+                <a16:creationId xmlns="" xmlns:a16="http://schemas.microsoft.com/office/drawing/2014/main" id="{C03B7812-397A-41A8-BF52-A6504BE74B37}"/>
+              </a:ext>
+            </a:extLst>
+          </p:cNvPr>
+          <p:cNvSpPr>
+            <a:spLocks noGrp="1"/>
+          </p:cNvSpPr>
+          <p:nvPr>
+            <p:ph idx="1"/>
+          </p:nvPr>
+        </p:nvSpPr>
+        <p:spPr/>
+        <p:txBody>
+          <a:bodyPr/>
+          <a:lstStyle/>
+          <a:p>
+            <a:r>
+              <a:rPr lang="fr-BE" dirty="0"/>
+              <a:t>First </a:t>
+            </a:r>
+            <a:r>
+              <a:rPr lang="fr-BE" dirty="0" err="1"/>
+              <a:t>extract</a:t>
+            </a:r>
+            <a:r>
+              <a:rPr lang="fr-BE" dirty="0"/>
+              <a:t> topics for all </a:t>
+            </a:r>
+            <a:r>
+              <a:rPr lang="fr-BE" dirty="0" err="1"/>
+              <a:t>chapters</a:t>
+            </a:r>
+            <a:r>
+              <a:rPr lang="fr-BE" dirty="0"/>
+              <a:t> </a:t>
+            </a:r>
+          </a:p>
+          <a:p>
+            <a:r>
+              <a:rPr lang="fr-BE" dirty="0" err="1"/>
+              <a:t>Then</a:t>
+            </a:r>
+            <a:r>
+              <a:rPr lang="fr-BE" dirty="0"/>
+              <a:t> </a:t>
+            </a:r>
+            <a:r>
+              <a:rPr lang="fr-BE" dirty="0" err="1"/>
+              <a:t>extract</a:t>
+            </a:r>
+            <a:r>
+              <a:rPr lang="fr-BE" dirty="0"/>
+              <a:t> one topic </a:t>
+            </a:r>
+            <a:r>
+              <a:rPr lang="fr-BE" dirty="0" err="1"/>
+              <a:t>from</a:t>
+            </a:r>
+            <a:r>
+              <a:rPr lang="fr-BE" dirty="0"/>
+              <a:t> </a:t>
+            </a:r>
+            <a:r>
+              <a:rPr lang="fr-BE" dirty="0" err="1"/>
+              <a:t>each</a:t>
+            </a:r>
+            <a:r>
+              <a:rPr lang="fr-BE" dirty="0"/>
+              <a:t> </a:t>
+            </a:r>
+            <a:r>
+              <a:rPr lang="fr-BE" dirty="0" err="1"/>
+              <a:t>chapter</a:t>
+            </a:r>
+            <a:r>
+              <a:rPr lang="fr-BE" dirty="0"/>
+              <a:t>, </a:t>
+            </a:r>
+            <a:r>
+              <a:rPr lang="fr-BE" dirty="0" err="1"/>
+              <a:t>trying</a:t>
+            </a:r>
+            <a:r>
+              <a:rPr lang="fr-BE" dirty="0"/>
+              <a:t> to </a:t>
+            </a:r>
+            <a:r>
+              <a:rPr lang="fr-BE" dirty="0" err="1"/>
+              <a:t>get</a:t>
+            </a:r>
+            <a:r>
+              <a:rPr lang="fr-BE" dirty="0"/>
+              <a:t> the </a:t>
+            </a:r>
+            <a:r>
+              <a:rPr lang="fr-BE" dirty="0" err="1"/>
+              <a:t>differences</a:t>
+            </a:r>
+            <a:r>
+              <a:rPr lang="fr-BE" dirty="0"/>
+              <a:t> in topics and </a:t>
+            </a:r>
+            <a:r>
+              <a:rPr lang="fr-BE" dirty="0" err="1"/>
+              <a:t>see</a:t>
+            </a:r>
+            <a:r>
+              <a:rPr lang="fr-BE" dirty="0"/>
+              <a:t> the story progression</a:t>
+            </a:r>
+          </a:p>
+        </p:txBody>
+      </p:sp>
+    </p:spTree>
+    <p:extLst>
+      <p:ext uri="{BB962C8B-B14F-4D97-AF65-F5344CB8AC3E}">
+        <p14:creationId xmlns:p14="http://schemas.microsoft.com/office/powerpoint/2010/main" val="2616280591"/>
+      </p:ext>
+    </p:extLst>
+  </p:cSld>
+  <p:clrMapOvr>
+    <a:masterClrMapping/>
+  </p:clrMapOvr>
+</p:sld>
+</file>
+
+<file path=ppt/slides/slide6.xml><?xml version="1.0" encoding="utf-8"?>
+<p:sld xmlns:a="http://schemas.openxmlformats.org/drawingml/2006/main" xmlns:r="http://schemas.openxmlformats.org/officeDocument/2006/relationships" xmlns:p="http://schemas.openxmlformats.org/presentationml/2006/main">
+  <p:cSld>
+    <p:spTree>
+      <p:nvGrpSpPr>
+        <p:cNvPr id="1" name=""/>
+        <p:cNvGrpSpPr/>
+        <p:nvPr/>
+      </p:nvGrpSpPr>
+      <p:grpSpPr>
+        <a:xfrm>
+          <a:off x="0" y="0"/>
+          <a:ext cx="0" cy="0"/>
+          <a:chOff x="0" y="0"/>
+          <a:chExt cx="0" cy="0"/>
+        </a:xfrm>
+      </p:grpSpPr>
+      <p:sp>
+        <p:nvSpPr>
+          <p:cNvPr id="2" name="Titre 1">
+            <a:extLst>
+              <a:ext uri="{FF2B5EF4-FFF2-40B4-BE49-F238E27FC236}">
+                <a16:creationId xmlns="" xmlns:a16="http://schemas.microsoft.com/office/drawing/2014/main" id="{F2477979-5622-459C-B989-5A4097664795}"/>
               </a:ext>
             </a:extLst>
           </p:cNvPr>
@@ -4119,7 +5901,7 @@
           <p:cNvPr id="3" name="Espace réservé du contenu 2">
             <a:extLst>
               <a:ext uri="{FF2B5EF4-FFF2-40B4-BE49-F238E27FC236}">
-                <a16:creationId xmlns:a16="http://schemas.microsoft.com/office/drawing/2014/main" xmlns="" id="{0F91CB54-8CAD-4E1B-8EF2-9ECA173B34B5}"/>
+                <a16:creationId xmlns="" xmlns:a16="http://schemas.microsoft.com/office/drawing/2014/main" id="{0F91CB54-8CAD-4E1B-8EF2-9ECA173B34B5}"/>
               </a:ext>
             </a:extLst>
           </p:cNvPr>
@@ -4251,7 +6033,7 @@
           <p:cNvPr id="1026" name="Picture 2" descr="https://lh6.googleusercontent.com/HyqY--K02gZ8Ziqz4zUUTRxP_TI6CLVPAKogQKPJ1I8RMwpASKyEG2UN_wT56LSnPRrJU0HOlcDGIsP6reJZyRzc2RcaZPW8ZImaPpp9gaxcQli37YqX1oXMgpuIlTDpyDB0BY5F">
             <a:extLst>
               <a:ext uri="{FF2B5EF4-FFF2-40B4-BE49-F238E27FC236}">
-                <a16:creationId xmlns:a16="http://schemas.microsoft.com/office/drawing/2014/main" xmlns="" id="{6ED5F093-21A9-4AA8-B20B-A9AF184B1D71}"/>
+                <a16:creationId xmlns="" xmlns:a16="http://schemas.microsoft.com/office/drawing/2014/main" id="{6ED5F093-21A9-4AA8-B20B-A9AF184B1D71}"/>
               </a:ext>
             </a:extLst>
           </p:cNvPr>
@@ -4298,7 +6080,7 @@
           <p:cNvPr id="5" name="Image 4">
             <a:extLst>
               <a:ext uri="{FF2B5EF4-FFF2-40B4-BE49-F238E27FC236}">
-                <a16:creationId xmlns:a16="http://schemas.microsoft.com/office/drawing/2014/main" xmlns="" id="{AD26E13A-B428-4515-9190-B3EBD84B91F3}"/>
+                <a16:creationId xmlns="" xmlns:a16="http://schemas.microsoft.com/office/drawing/2014/main" id="{AD26E13A-B428-4515-9190-B3EBD84B91F3}"/>
               </a:ext>
             </a:extLst>
           </p:cNvPr>
@@ -4336,7 +6118,7 @@
 </p:sld>
 </file>
 
-<file path=ppt/slides/slide5.xml><?xml version="1.0" encoding="utf-8"?>
+<file path=ppt/slides/slide7.xml><?xml version="1.0" encoding="utf-8"?>
 <p:sld xmlns:a="http://schemas.openxmlformats.org/drawingml/2006/main" xmlns:r="http://schemas.openxmlformats.org/officeDocument/2006/relationships" xmlns:p="http://schemas.openxmlformats.org/presentationml/2006/main">
   <p:cSld>
     <p:spTree>
@@ -4358,7 +6140,7 @@
           <p:cNvPr id="2" name="Titre 1">
             <a:extLst>
               <a:ext uri="{FF2B5EF4-FFF2-40B4-BE49-F238E27FC236}">
-                <a16:creationId xmlns:a16="http://schemas.microsoft.com/office/drawing/2014/main" xmlns="" id="{93F84DE8-AD66-4873-A835-8CF8B95ADF22}"/>
+                <a16:creationId xmlns="" xmlns:a16="http://schemas.microsoft.com/office/drawing/2014/main" id="{93F84DE8-AD66-4873-A835-8CF8B95ADF22}"/>
               </a:ext>
             </a:extLst>
           </p:cNvPr>
@@ -4386,7 +6168,7 @@
           <p:cNvPr id="3" name="Espace réservé du contenu 2">
             <a:extLst>
               <a:ext uri="{FF2B5EF4-FFF2-40B4-BE49-F238E27FC236}">
-                <a16:creationId xmlns:a16="http://schemas.microsoft.com/office/drawing/2014/main" xmlns="" id="{C73F5A3D-E7B7-4D43-B2A7-7F0F78F8C9E2}"/>
+                <a16:creationId xmlns="" xmlns:a16="http://schemas.microsoft.com/office/drawing/2014/main" id="{C73F5A3D-E7B7-4D43-B2A7-7F0F78F8C9E2}"/>
               </a:ext>
             </a:extLst>
           </p:cNvPr>
@@ -4501,7 +6283,7 @@
           <p:cNvPr id="5" name="Image 4">
             <a:extLst>
               <a:ext uri="{FF2B5EF4-FFF2-40B4-BE49-F238E27FC236}">
-                <a16:creationId xmlns:a16="http://schemas.microsoft.com/office/drawing/2014/main" xmlns="" id="{BC12680B-CE48-4DE8-B7E6-D3A3FCC23BCC}"/>
+                <a16:creationId xmlns="" xmlns:a16="http://schemas.microsoft.com/office/drawing/2014/main" id="{BC12680B-CE48-4DE8-B7E6-D3A3FCC23BCC}"/>
               </a:ext>
             </a:extLst>
           </p:cNvPr>
@@ -4539,7 +6321,7 @@
 </p:sld>
 </file>
 
-<file path=ppt/slides/slide6.xml><?xml version="1.0" encoding="utf-8"?>
+<file path=ppt/slides/slide8.xml><?xml version="1.0" encoding="utf-8"?>
 <p:sld xmlns:a="http://schemas.openxmlformats.org/drawingml/2006/main" xmlns:r="http://schemas.openxmlformats.org/officeDocument/2006/relationships" xmlns:p="http://schemas.openxmlformats.org/presentationml/2006/main">
   <p:cSld>
     <p:spTree>
@@ -4561,7 +6343,7 @@
           <p:cNvPr id="2" name="Titre 1">
             <a:extLst>
               <a:ext uri="{FF2B5EF4-FFF2-40B4-BE49-F238E27FC236}">
-                <a16:creationId xmlns:a16="http://schemas.microsoft.com/office/drawing/2014/main" xmlns="" id="{860E1C3F-1645-456F-AE7A-8A9430CCAC3E}"/>
+                <a16:creationId xmlns="" xmlns:a16="http://schemas.microsoft.com/office/drawing/2014/main" id="{860E1C3F-1645-456F-AE7A-8A9430CCAC3E}"/>
               </a:ext>
             </a:extLst>
           </p:cNvPr>
@@ -4589,7 +6371,7 @@
           <p:cNvPr id="3" name="Espace réservé du contenu 2">
             <a:extLst>
               <a:ext uri="{FF2B5EF4-FFF2-40B4-BE49-F238E27FC236}">
-                <a16:creationId xmlns:a16="http://schemas.microsoft.com/office/drawing/2014/main" xmlns="" id="{F91A640E-B1A7-4F54-9FFF-0FEFA4EC8EE1}"/>
+                <a16:creationId xmlns="" xmlns:a16="http://schemas.microsoft.com/office/drawing/2014/main" id="{F91A640E-B1A7-4F54-9FFF-0FEFA4EC8EE1}"/>
               </a:ext>
             </a:extLst>
           </p:cNvPr>
@@ -4824,7 +6606,7 @@
 </p:sld>
 </file>
 
-<file path=ppt/slides/slide7.xml><?xml version="1.0" encoding="utf-8"?>
+<file path=ppt/slides/slide9.xml><?xml version="1.0" encoding="utf-8"?>
 <p:sld xmlns:a="http://schemas.openxmlformats.org/drawingml/2006/main" xmlns:r="http://schemas.openxmlformats.org/officeDocument/2006/relationships" xmlns:p="http://schemas.openxmlformats.org/presentationml/2006/main">
   <p:cSld>
     <p:spTree>
@@ -4846,7 +6628,7 @@
           <p:cNvPr id="2" name="Titre 1">
             <a:extLst>
               <a:ext uri="{FF2B5EF4-FFF2-40B4-BE49-F238E27FC236}">
-                <a16:creationId xmlns:a16="http://schemas.microsoft.com/office/drawing/2014/main" xmlns="" id="{34F54331-F0AA-4796-88CA-4B3366C243B2}"/>
+                <a16:creationId xmlns="" xmlns:a16="http://schemas.microsoft.com/office/drawing/2014/main" id="{34F54331-F0AA-4796-88CA-4B3366C243B2}"/>
               </a:ext>
             </a:extLst>
           </p:cNvPr>
@@ -4888,7 +6670,7 @@
           <p:cNvPr id="3" name="Espace réservé du contenu 2">
             <a:extLst>
               <a:ext uri="{FF2B5EF4-FFF2-40B4-BE49-F238E27FC236}">
-                <a16:creationId xmlns:a16="http://schemas.microsoft.com/office/drawing/2014/main" xmlns="" id="{52052228-2A80-4411-B714-4B7F17F3752F}"/>
+                <a16:creationId xmlns="" xmlns:a16="http://schemas.microsoft.com/office/drawing/2014/main" id="{52052228-2A80-4411-B714-4B7F17F3752F}"/>
               </a:ext>
             </a:extLst>
           </p:cNvPr>
@@ -5141,7 +6923,7 @@
           <p:cNvPr id="2052" name="Picture 4" descr="https://lh6.googleusercontent.com/mQOVeYBH0U4wSeExCqUw4zdAM0t05THRPdt38N83Hj7S33yBWJcKfnwVnNlHPO-XSklnarqSPfvEC-OswOEpXK9PePuPtLuwVqiFSXElyHzM19e1DkNLlpf5k8xPXNEyriRgBI-b">
             <a:extLst>
               <a:ext uri="{FF2B5EF4-FFF2-40B4-BE49-F238E27FC236}">
-                <a16:creationId xmlns:a16="http://schemas.microsoft.com/office/drawing/2014/main" xmlns="" id="{C123597C-615B-4E45-AE78-6CA8B8344FB7}"/>
+                <a16:creationId xmlns="" xmlns:a16="http://schemas.microsoft.com/office/drawing/2014/main" id="{C123597C-615B-4E45-AE78-6CA8B8344FB7}"/>
               </a:ext>
             </a:extLst>
           </p:cNvPr>
@@ -5187,494 +6969,6 @@
     <p:extLst>
       <p:ext uri="{BB962C8B-B14F-4D97-AF65-F5344CB8AC3E}">
         <p14:creationId xmlns:p14="http://schemas.microsoft.com/office/powerpoint/2010/main" val="3928971029"/>
-      </p:ext>
-    </p:extLst>
-  </p:cSld>
-  <p:clrMapOvr>
-    <a:masterClrMapping/>
-  </p:clrMapOvr>
-</p:sld>
-</file>
-
-<file path=ppt/slides/slide8.xml><?xml version="1.0" encoding="utf-8"?>
-<p:sld xmlns:a="http://schemas.openxmlformats.org/drawingml/2006/main" xmlns:r="http://schemas.openxmlformats.org/officeDocument/2006/relationships" xmlns:p="http://schemas.openxmlformats.org/presentationml/2006/main">
-  <p:cSld>
-    <p:spTree>
-      <p:nvGrpSpPr>
-        <p:cNvPr id="1" name=""/>
-        <p:cNvGrpSpPr/>
-        <p:nvPr/>
-      </p:nvGrpSpPr>
-      <p:grpSpPr>
-        <a:xfrm>
-          <a:off x="0" y="0"/>
-          <a:ext cx="0" cy="0"/>
-          <a:chOff x="0" y="0"/>
-          <a:chExt cx="0" cy="0"/>
-        </a:xfrm>
-      </p:grpSpPr>
-      <p:sp>
-        <p:nvSpPr>
-          <p:cNvPr id="2" name="Titre 1">
-            <a:extLst>
-              <a:ext uri="{FF2B5EF4-FFF2-40B4-BE49-F238E27FC236}">
-                <a16:creationId xmlns:a16="http://schemas.microsoft.com/office/drawing/2014/main" xmlns="" id="{01FBDD91-A41B-4B21-811F-E25831E8830D}"/>
-              </a:ext>
-            </a:extLst>
-          </p:cNvPr>
-          <p:cNvSpPr>
-            <a:spLocks noGrp="1"/>
-          </p:cNvSpPr>
-          <p:nvPr>
-            <p:ph type="title"/>
-          </p:nvPr>
-        </p:nvSpPr>
-        <p:spPr/>
-        <p:txBody>
-          <a:bodyPr/>
-          <a:lstStyle/>
-          <a:p>
-            <a:r>
-              <a:rPr lang="fr-BE" dirty="0" err="1"/>
-              <a:t>Simplified</a:t>
-            </a:r>
-            <a:r>
-              <a:rPr lang="fr-BE" dirty="0"/>
-              <a:t> </a:t>
-            </a:r>
-            <a:r>
-              <a:rPr lang="fr-BE" dirty="0" err="1"/>
-              <a:t>search</a:t>
-            </a:r>
-            <a:r>
-              <a:rPr lang="fr-BE" dirty="0"/>
-              <a:t> engine </a:t>
-            </a:r>
-          </a:p>
-        </p:txBody>
-      </p:sp>
-      <p:sp>
-        <p:nvSpPr>
-          <p:cNvPr id="3" name="Espace réservé du contenu 2">
-            <a:extLst>
-              <a:ext uri="{FF2B5EF4-FFF2-40B4-BE49-F238E27FC236}">
-                <a16:creationId xmlns:a16="http://schemas.microsoft.com/office/drawing/2014/main" xmlns="" id="{59D9F553-2551-4403-8986-4A7B277CD33B}"/>
-              </a:ext>
-            </a:extLst>
-          </p:cNvPr>
-          <p:cNvSpPr>
-            <a:spLocks noGrp="1"/>
-          </p:cNvSpPr>
-          <p:nvPr>
-            <p:ph idx="1"/>
-          </p:nvPr>
-        </p:nvSpPr>
-        <p:spPr/>
-        <p:txBody>
-          <a:bodyPr/>
-          <a:lstStyle/>
-          <a:p>
-            <a:r>
-              <a:rPr lang="fr-BE" dirty="0" err="1"/>
-              <a:t>Using</a:t>
-            </a:r>
-            <a:r>
-              <a:rPr lang="fr-BE" dirty="0"/>
-              <a:t> </a:t>
-            </a:r>
-            <a:r>
-              <a:rPr lang="fr-BE" dirty="0" err="1"/>
-              <a:t>tf-idf</a:t>
-            </a:r>
-            <a:r>
-              <a:rPr lang="fr-BE" dirty="0"/>
-              <a:t> </a:t>
-            </a:r>
-            <a:r>
-              <a:rPr lang="fr-BE" dirty="0" err="1"/>
-              <a:t>we</a:t>
-            </a:r>
-            <a:r>
-              <a:rPr lang="fr-BE" dirty="0"/>
-              <a:t> </a:t>
-            </a:r>
-            <a:r>
-              <a:rPr lang="fr-BE" dirty="0" err="1"/>
-              <a:t>tried</a:t>
-            </a:r>
-            <a:r>
-              <a:rPr lang="fr-BE" dirty="0"/>
-              <a:t> to </a:t>
-            </a:r>
-            <a:r>
-              <a:rPr lang="fr-BE" dirty="0" err="1"/>
-              <a:t>make</a:t>
-            </a:r>
-            <a:r>
-              <a:rPr lang="fr-BE" dirty="0"/>
-              <a:t> a simple </a:t>
-            </a:r>
-            <a:r>
-              <a:rPr lang="fr-BE" dirty="0" err="1"/>
-              <a:t>search</a:t>
-            </a:r>
-            <a:r>
-              <a:rPr lang="fr-BE" dirty="0"/>
-              <a:t> engine for the book. </a:t>
-            </a:r>
-          </a:p>
-          <a:p>
-            <a:r>
-              <a:rPr lang="fr-BE" dirty="0"/>
-              <a:t>This can </a:t>
-            </a:r>
-            <a:r>
-              <a:rPr lang="fr-BE" dirty="0" err="1"/>
-              <a:t>prove</a:t>
-            </a:r>
-            <a:r>
-              <a:rPr lang="fr-BE" dirty="0"/>
-              <a:t> </a:t>
-            </a:r>
-            <a:r>
-              <a:rPr lang="fr-BE" dirty="0" err="1"/>
-              <a:t>very</a:t>
-            </a:r>
-            <a:r>
-              <a:rPr lang="fr-BE" dirty="0"/>
-              <a:t> </a:t>
-            </a:r>
-            <a:r>
-              <a:rPr lang="fr-BE" dirty="0" err="1"/>
-              <a:t>useful</a:t>
-            </a:r>
-            <a:r>
-              <a:rPr lang="fr-BE" dirty="0"/>
-              <a:t> in case </a:t>
-            </a:r>
-            <a:r>
-              <a:rPr lang="fr-BE" dirty="0" err="1"/>
-              <a:t>you</a:t>
-            </a:r>
-            <a:r>
-              <a:rPr lang="fr-BE" dirty="0"/>
-              <a:t> </a:t>
-            </a:r>
-            <a:r>
-              <a:rPr lang="fr-BE" dirty="0" err="1"/>
-              <a:t>havn’t</a:t>
-            </a:r>
-            <a:r>
-              <a:rPr lang="fr-BE" dirty="0"/>
-              <a:t> </a:t>
-            </a:r>
-            <a:r>
-              <a:rPr lang="fr-BE" dirty="0" err="1"/>
-              <a:t>read</a:t>
-            </a:r>
-            <a:r>
-              <a:rPr lang="fr-BE" dirty="0"/>
-              <a:t> the book and </a:t>
-            </a:r>
-            <a:r>
-              <a:rPr lang="fr-BE" dirty="0" err="1"/>
-              <a:t>want</a:t>
-            </a:r>
-            <a:r>
-              <a:rPr lang="fr-BE" dirty="0"/>
-              <a:t> to </a:t>
-            </a:r>
-            <a:r>
-              <a:rPr lang="fr-BE" dirty="0" err="1"/>
-              <a:t>search</a:t>
-            </a:r>
-            <a:r>
-              <a:rPr lang="fr-BE" dirty="0"/>
-              <a:t> for </a:t>
-            </a:r>
-            <a:r>
-              <a:rPr lang="fr-BE" dirty="0" err="1"/>
-              <a:t>specific</a:t>
-            </a:r>
-            <a:r>
-              <a:rPr lang="fr-BE" dirty="0"/>
-              <a:t> parts. </a:t>
-            </a:r>
-          </a:p>
-          <a:p>
-            <a:r>
-              <a:rPr lang="fr-BE" dirty="0"/>
-              <a:t>Uses </a:t>
-            </a:r>
-            <a:r>
-              <a:rPr lang="fr-BE" dirty="0" err="1"/>
-              <a:t>tfidf</a:t>
-            </a:r>
-            <a:r>
-              <a:rPr lang="fr-BE" dirty="0"/>
-              <a:t> </a:t>
-            </a:r>
-            <a:r>
-              <a:rPr lang="fr-BE" dirty="0" err="1"/>
-              <a:t>cosines</a:t>
-            </a:r>
-            <a:r>
-              <a:rPr lang="fr-BE" dirty="0"/>
-              <a:t> to </a:t>
-            </a:r>
-            <a:r>
-              <a:rPr lang="fr-BE" dirty="0" err="1"/>
-              <a:t>generate</a:t>
-            </a:r>
-            <a:r>
-              <a:rPr lang="fr-BE" dirty="0"/>
-              <a:t> a </a:t>
-            </a:r>
-            <a:r>
-              <a:rPr lang="fr-BE" dirty="0" err="1"/>
-              <a:t>similarity</a:t>
-            </a:r>
-            <a:r>
-              <a:rPr lang="fr-BE" dirty="0"/>
-              <a:t> </a:t>
-            </a:r>
-            <a:r>
-              <a:rPr lang="fr-BE" dirty="0" err="1"/>
-              <a:t>between</a:t>
-            </a:r>
-            <a:r>
-              <a:rPr lang="fr-BE" dirty="0"/>
-              <a:t> </a:t>
-            </a:r>
-            <a:r>
-              <a:rPr lang="fr-BE" dirty="0" err="1"/>
-              <a:t>query</a:t>
-            </a:r>
-            <a:r>
-              <a:rPr lang="fr-BE" dirty="0"/>
-              <a:t> and documents, </a:t>
-            </a:r>
-            <a:r>
-              <a:rPr lang="fr-BE" dirty="0" err="1"/>
-              <a:t>then</a:t>
-            </a:r>
-            <a:r>
-              <a:rPr lang="fr-BE" dirty="0"/>
-              <a:t> return the </a:t>
-            </a:r>
-            <a:r>
-              <a:rPr lang="fr-BE" dirty="0" err="1"/>
-              <a:t>highest</a:t>
-            </a:r>
-            <a:r>
-              <a:rPr lang="fr-BE" dirty="0"/>
-              <a:t> one. </a:t>
-            </a:r>
-          </a:p>
-          <a:p>
-            <a:endParaRPr lang="fr-BE" dirty="0"/>
-          </a:p>
-        </p:txBody>
-      </p:sp>
-      <p:pic>
-        <p:nvPicPr>
-          <p:cNvPr id="5" name="Image 4">
-            <a:extLst>
-              <a:ext uri="{FF2B5EF4-FFF2-40B4-BE49-F238E27FC236}">
-                <a16:creationId xmlns:a16="http://schemas.microsoft.com/office/drawing/2014/main" xmlns="" id="{0B14C756-047D-447F-92C5-EE7DC973CD94}"/>
-              </a:ext>
-            </a:extLst>
-          </p:cNvPr>
-          <p:cNvPicPr>
-            <a:picLocks noChangeAspect="1"/>
-          </p:cNvPicPr>
-          <p:nvPr/>
-        </p:nvPicPr>
-        <p:blipFill>
-          <a:blip r:embed="rId2"/>
-          <a:stretch>
-            <a:fillRect/>
-          </a:stretch>
-        </p:blipFill>
-        <p:spPr>
-          <a:xfrm>
-            <a:off x="2809416" y="4246713"/>
-            <a:ext cx="6573167" cy="2010056"/>
-          </a:xfrm>
-          <a:prstGeom prst="rect">
-            <a:avLst/>
-          </a:prstGeom>
-        </p:spPr>
-      </p:pic>
-    </p:spTree>
-    <p:extLst>
-      <p:ext uri="{BB962C8B-B14F-4D97-AF65-F5344CB8AC3E}">
-        <p14:creationId xmlns:p14="http://schemas.microsoft.com/office/powerpoint/2010/main" val="2237523622"/>
-      </p:ext>
-    </p:extLst>
-  </p:cSld>
-  <p:clrMapOvr>
-    <a:masterClrMapping/>
-  </p:clrMapOvr>
-</p:sld>
-</file>
-
-<file path=ppt/slides/slide9.xml><?xml version="1.0" encoding="utf-8"?>
-<p:sld xmlns:a="http://schemas.openxmlformats.org/drawingml/2006/main" xmlns:r="http://schemas.openxmlformats.org/officeDocument/2006/relationships" xmlns:p="http://schemas.openxmlformats.org/presentationml/2006/main">
-  <p:cSld>
-    <p:spTree>
-      <p:nvGrpSpPr>
-        <p:cNvPr id="1" name=""/>
-        <p:cNvGrpSpPr/>
-        <p:nvPr/>
-      </p:nvGrpSpPr>
-      <p:grpSpPr>
-        <a:xfrm>
-          <a:off x="0" y="0"/>
-          <a:ext cx="0" cy="0"/>
-          <a:chOff x="0" y="0"/>
-          <a:chExt cx="0" cy="0"/>
-        </a:xfrm>
-      </p:grpSpPr>
-      <p:sp>
-        <p:nvSpPr>
-          <p:cNvPr id="2" name="Titre 1">
-            <a:extLst>
-              <a:ext uri="{FF2B5EF4-FFF2-40B4-BE49-F238E27FC236}">
-                <a16:creationId xmlns:a16="http://schemas.microsoft.com/office/drawing/2014/main" xmlns="" id="{C14150E0-2A78-4F7D-BFE7-AE2220A9FF63}"/>
-              </a:ext>
-            </a:extLst>
-          </p:cNvPr>
-          <p:cNvSpPr>
-            <a:spLocks noGrp="1"/>
-          </p:cNvSpPr>
-          <p:nvPr>
-            <p:ph type="title"/>
-          </p:nvPr>
-        </p:nvSpPr>
-        <p:spPr>
-          <a:xfrm>
-            <a:off x="1451579" y="410237"/>
-            <a:ext cx="9291215" cy="1049235"/>
-          </a:xfrm>
-        </p:spPr>
-        <p:txBody>
-          <a:bodyPr/>
-          <a:lstStyle/>
-          <a:p>
-            <a:r>
-              <a:rPr lang="fr-BE" dirty="0"/>
-              <a:t>Tf-</a:t>
-            </a:r>
-            <a:r>
-              <a:rPr lang="fr-BE" dirty="0" err="1"/>
-              <a:t>idf</a:t>
-            </a:r>
-            <a:r>
-              <a:rPr lang="fr-BE" dirty="0"/>
-              <a:t> </a:t>
-            </a:r>
-            <a:r>
-              <a:rPr lang="fr-BE" dirty="0" err="1"/>
-              <a:t>query</a:t>
-            </a:r>
-            <a:r>
-              <a:rPr lang="fr-BE" dirty="0"/>
-              <a:t> exemple</a:t>
-            </a:r>
-          </a:p>
-        </p:txBody>
-      </p:sp>
-      <p:sp>
-        <p:nvSpPr>
-          <p:cNvPr id="3" name="Espace réservé du contenu 2">
-            <a:extLst>
-              <a:ext uri="{FF2B5EF4-FFF2-40B4-BE49-F238E27FC236}">
-                <a16:creationId xmlns:a16="http://schemas.microsoft.com/office/drawing/2014/main" xmlns="" id="{C8D5C7A9-CBCC-4D39-8F63-A1587699988D}"/>
-              </a:ext>
-            </a:extLst>
-          </p:cNvPr>
-          <p:cNvSpPr>
-            <a:spLocks noGrp="1"/>
-          </p:cNvSpPr>
-          <p:nvPr>
-            <p:ph idx="1"/>
-          </p:nvPr>
-        </p:nvSpPr>
-        <p:spPr>
-          <a:xfrm>
-            <a:off x="1451579" y="1394946"/>
-            <a:ext cx="9291215" cy="3450613"/>
-          </a:xfrm>
-        </p:spPr>
-        <p:txBody>
-          <a:bodyPr/>
-          <a:lstStyle/>
-          <a:p>
-            <a:r>
-              <a:rPr lang="en-US" dirty="0"/>
-              <a:t>"I stopped at hotel </a:t>
-            </a:r>
-            <a:r>
-              <a:rPr lang="en-US" dirty="0" err="1"/>
-              <a:t>royale</a:t>
-            </a:r>
-            <a:r>
-              <a:rPr lang="en-US" dirty="0"/>
-              <a:t>, we had a good diner and </a:t>
-            </a:r>
-            <a:r>
-              <a:rPr lang="en-US" dirty="0" err="1"/>
-              <a:t>i</a:t>
-            </a:r>
-            <a:r>
-              <a:rPr lang="en-US" dirty="0"/>
-              <a:t> then visited a museum.“</a:t>
-            </a:r>
-          </a:p>
-          <a:p>
-            <a:r>
-              <a:rPr lang="en-US" dirty="0"/>
-              <a:t>This is about the very beginning of the book so it should return first block</a:t>
-            </a:r>
-            <a:endParaRPr lang="fr-BE" dirty="0"/>
-          </a:p>
-        </p:txBody>
-      </p:sp>
-      <p:pic>
-        <p:nvPicPr>
-          <p:cNvPr id="5" name="Image 4">
-            <a:extLst>
-              <a:ext uri="{FF2B5EF4-FFF2-40B4-BE49-F238E27FC236}">
-                <a16:creationId xmlns:a16="http://schemas.microsoft.com/office/drawing/2014/main" xmlns="" id="{FDA75C6B-C8F6-43AE-88CF-44E620EB32F3}"/>
-              </a:ext>
-            </a:extLst>
-          </p:cNvPr>
-          <p:cNvPicPr>
-            <a:picLocks noChangeAspect="1"/>
-          </p:cNvPicPr>
-          <p:nvPr/>
-        </p:nvPicPr>
-        <p:blipFill>
-          <a:blip r:embed="rId2"/>
-          <a:stretch>
-            <a:fillRect/>
-          </a:stretch>
-        </p:blipFill>
-        <p:spPr>
-          <a:xfrm>
-            <a:off x="1894888" y="2737822"/>
-            <a:ext cx="8402223" cy="3248478"/>
-          </a:xfrm>
-          <a:prstGeom prst="rect">
-            <a:avLst/>
-          </a:prstGeom>
-        </p:spPr>
-      </p:pic>
-    </p:spTree>
-    <p:extLst>
-      <p:ext uri="{BB962C8B-B14F-4D97-AF65-F5344CB8AC3E}">
-        <p14:creationId xmlns:p14="http://schemas.microsoft.com/office/powerpoint/2010/main" val="1234201250"/>
       </p:ext>
     </p:extLst>
   </p:cSld>
@@ -5931,7 +7225,7 @@
   <a:extraClrSchemeLst/>
   <a:extLst>
     <a:ext uri="{05A4C25C-085E-4340-85A3-A5531E510DB2}">
-      <thm15:themeFamily xmlns:thm15="http://schemas.microsoft.com/office/thememl/2012/main" xmlns="" name="Gallery" id="{BBFCD31E-59A1-489D-B089-A3EAD7CAE12E}" vid="{BB5F5D82-B5E9-469E-A815-C655ED4AF243}"/>
+      <thm15:themeFamily xmlns="" xmlns:thm15="http://schemas.microsoft.com/office/thememl/2012/main" name="Gallery" id="{BBFCD31E-59A1-489D-B089-A3EAD7CAE12E}" vid="{BB5F5D82-B5E9-469E-A815-C655ED4AF243}"/>
     </a:ext>
   </a:extLst>
 </a:theme>

</xml_diff>

<commit_message>
It's fucking done bitch
AAAAAAAAAAAAAAAAAAAAAAAAAAAAAAAAAAAAAAAAHHHHHHHHHHHHHHHHHHHHHHHHHHHHHHHHHHHHHHAAAAAAAAAAAAAAAAAAAAAAAAAAAAAAAAAAAAAAAAAAAAAAAAAAAAAAAAAAAAAAAAAAAAAAAAAAAAAAAAAAAAA
</commit_message>
<xml_diff>
--- a/Understanding Dracula.pptx
+++ b/Understanding Dracula.pptx
@@ -23,6 +23,7 @@
     <p:sldId id="264" r:id="rId17"/>
     <p:sldId id="272" r:id="rId18"/>
     <p:sldId id="273" r:id="rId19"/>
+    <p:sldId id="274" r:id="rId20"/>
   </p:sldIdLst>
   <p:sldSz cx="12192000" cy="6858000"/>
   <p:notesSz cx="6858000" cy="9144000"/>
@@ -3253,7 +3254,7 @@
           <p:cNvPr id="6" name="Sous-titre 2">
             <a:extLst>
               <a:ext uri="{FF2B5EF4-FFF2-40B4-BE49-F238E27FC236}">
-                <a16:creationId xmlns="" xmlns:a16="http://schemas.microsoft.com/office/drawing/2014/main" id="{C4566099-AAD9-4AAA-9D26-572BF887E13C}"/>
+                <a16:creationId xmlns:a16="http://schemas.microsoft.com/office/drawing/2014/main" xmlns="" id="{C4566099-AAD9-4AAA-9D26-572BF887E13C}"/>
               </a:ext>
             </a:extLst>
           </p:cNvPr>
@@ -3594,7 +3595,7 @@
           <p:cNvPr id="2" name="Titre 1">
             <a:extLst>
               <a:ext uri="{FF2B5EF4-FFF2-40B4-BE49-F238E27FC236}">
-                <a16:creationId xmlns="" xmlns:a16="http://schemas.microsoft.com/office/drawing/2014/main" id="{A093F50F-C593-40A9-95E7-FFE1F76D3966}"/>
+                <a16:creationId xmlns:a16="http://schemas.microsoft.com/office/drawing/2014/main" xmlns="" id="{A093F50F-C593-40A9-95E7-FFE1F76D3966}"/>
               </a:ext>
             </a:extLst>
           </p:cNvPr>
@@ -3628,7 +3629,7 @@
           <p:cNvPr id="3" name="Espace réservé du contenu 2">
             <a:extLst>
               <a:ext uri="{FF2B5EF4-FFF2-40B4-BE49-F238E27FC236}">
-                <a16:creationId xmlns="" xmlns:a16="http://schemas.microsoft.com/office/drawing/2014/main" id="{1A485B1E-6CDE-46C3-9E2C-1F013AFAAE45}"/>
+                <a16:creationId xmlns:a16="http://schemas.microsoft.com/office/drawing/2014/main" xmlns="" id="{1A485B1E-6CDE-46C3-9E2C-1F013AFAAE45}"/>
               </a:ext>
             </a:extLst>
           </p:cNvPr>
@@ -3706,7 +3707,6 @@
               <a:rPr lang="en-US"/>
               <a:t>["count", "dracula", "beast", "vampire", "jonathan", "mina", "murray","arthur", "holwood", "quincey", "morris", "renfield", "john", "seward", "abraham", "helsing", "lucy", "westenra"]</a:t>
             </a:r>
-            <a:endParaRPr lang="en-US"/>
           </a:p>
           <a:p>
             <a:pPr fontAlgn="base"/>
@@ -3719,11 +3719,7 @@
             <a:pPr fontAlgn="base"/>
             <a:r>
               <a:rPr lang="en-US"/>
-              <a:t>Replacing  sets of characters that consisted of the same character multiple times by sets containing only </a:t>
-            </a:r>
-            <a:r>
-              <a:rPr lang="en-US"/>
-              <a:t>the </a:t>
+              <a:t>Replacing  sets of characters that consisted of the same character multiple times by sets containing only the </a:t>
             </a:r>
             <a:r>
               <a:rPr lang="en-US" smtClean="0"/>
@@ -3768,7 +3764,7 @@
           <p:cNvPr id="2" name="Titre 1">
             <a:extLst>
               <a:ext uri="{FF2B5EF4-FFF2-40B4-BE49-F238E27FC236}">
-                <a16:creationId xmlns="" xmlns:a16="http://schemas.microsoft.com/office/drawing/2014/main" id="{A093F50F-C593-40A9-95E7-FFE1F76D3966}"/>
+                <a16:creationId xmlns:a16="http://schemas.microsoft.com/office/drawing/2014/main" xmlns="" id="{A093F50F-C593-40A9-95E7-FFE1F76D3966}"/>
               </a:ext>
             </a:extLst>
           </p:cNvPr>
@@ -3802,7 +3798,7 @@
           <p:cNvPr id="3" name="Espace réservé du contenu 2">
             <a:extLst>
               <a:ext uri="{FF2B5EF4-FFF2-40B4-BE49-F238E27FC236}">
-                <a16:creationId xmlns="" xmlns:a16="http://schemas.microsoft.com/office/drawing/2014/main" id="{1A485B1E-6CDE-46C3-9E2C-1F013AFAAE45}"/>
+                <a16:creationId xmlns:a16="http://schemas.microsoft.com/office/drawing/2014/main" xmlns="" id="{1A485B1E-6CDE-46C3-9E2C-1F013AFAAE45}"/>
               </a:ext>
             </a:extLst>
           </p:cNvPr>
@@ -3847,43 +3843,22 @@
             <a:pPr lvl="1"/>
             <a:r>
               <a:rPr lang="en-US"/>
-              <a:t>A list </a:t>
-            </a:r>
+              <a:t>A list of transactions (sets of names appearing together)</a:t>
+            </a:r>
+          </a:p>
+          <a:p>
+            <a:pPr lvl="1"/>
             <a:r>
               <a:rPr lang="en-US"/>
-              <a:t>of transactions (sets of names appearing </a:t>
-            </a:r>
+              <a:t>An integer minimum support and</a:t>
+            </a:r>
+          </a:p>
+          <a:p>
+            <a:pPr lvl="1"/>
             <a:r>
               <a:rPr lang="en-US"/>
-              <a:t>together)</a:t>
-            </a:r>
-          </a:p>
-          <a:p>
-            <a:pPr lvl="1"/>
-            <a:r>
-              <a:rPr lang="en-US"/>
-              <a:t>An integer </a:t>
-            </a:r>
-            <a:r>
-              <a:rPr lang="en-US"/>
-              <a:t>minimum support </a:t>
-            </a:r>
-            <a:r>
-              <a:rPr lang="en-US"/>
-              <a:t>and</a:t>
-            </a:r>
-          </a:p>
-          <a:p>
-            <a:pPr lvl="1"/>
-            <a:r>
-              <a:rPr lang="en-US"/>
-              <a:t>An integer </a:t>
-            </a:r>
-            <a:r>
-              <a:rPr lang="en-US"/>
-              <a:t>maximum length of character sets, and then proceeds as follow (for every chapter, as will be explained later):</a:t>
-            </a:r>
-            <a:endParaRPr lang="en-US"/>
+              <a:t>An integer maximum length of character sets, and then proceeds as follow (for every chapter, as will be explained later):</a:t>
+            </a:r>
           </a:p>
           <a:p>
             <a:pPr fontAlgn="base"/>
@@ -3964,7 +3939,7 @@
           <p:cNvPr id="2" name="Titre 1">
             <a:extLst>
               <a:ext uri="{FF2B5EF4-FFF2-40B4-BE49-F238E27FC236}">
-                <a16:creationId xmlns="" xmlns:a16="http://schemas.microsoft.com/office/drawing/2014/main" id="{A093F50F-C593-40A9-95E7-FFE1F76D3966}"/>
+                <a16:creationId xmlns:a16="http://schemas.microsoft.com/office/drawing/2014/main" xmlns="" id="{A093F50F-C593-40A9-95E7-FFE1F76D3966}"/>
               </a:ext>
             </a:extLst>
           </p:cNvPr>
@@ -3998,7 +3973,7 @@
           <p:cNvPr id="3" name="Espace réservé du contenu 2">
             <a:extLst>
               <a:ext uri="{FF2B5EF4-FFF2-40B4-BE49-F238E27FC236}">
-                <a16:creationId xmlns="" xmlns:a16="http://schemas.microsoft.com/office/drawing/2014/main" id="{1A485B1E-6CDE-46C3-9E2C-1F013AFAAE45}"/>
+                <a16:creationId xmlns:a16="http://schemas.microsoft.com/office/drawing/2014/main" xmlns="" id="{1A485B1E-6CDE-46C3-9E2C-1F013AFAAE45}"/>
               </a:ext>
             </a:extLst>
           </p:cNvPr>
@@ -4037,11 +4012,7 @@
             </a:r>
             <a:r>
               <a:rPr lang="en-US"/>
-              <a:t>in codes (e.g. : "Count Dracula" -&gt; "a") in order to create a list that can easily be taken </a:t>
-            </a:r>
-            <a:r>
-              <a:rPr lang="en-US"/>
-              <a:t>as </a:t>
+              <a:t>in codes (e.g. : "Count Dracula" -&gt; "a") in order to create a list that can easily be taken as </a:t>
             </a:r>
             <a:r>
               <a:rPr lang="en-US" smtClean="0"/>
@@ -4082,11 +4053,7 @@
             <a:pPr lvl="1" fontAlgn="base"/>
             <a:r>
               <a:rPr lang="en-US"/>
-              <a:t>Converted character codes back </a:t>
-            </a:r>
-            <a:r>
-              <a:rPr lang="en-US"/>
-              <a:t>to </a:t>
+              <a:t>Converted character codes back to </a:t>
             </a:r>
             <a:r>
               <a:rPr lang="en-US" smtClean="0"/>
@@ -4138,7 +4105,7 @@
           <p:cNvPr id="2" name="Titre 1">
             <a:extLst>
               <a:ext uri="{FF2B5EF4-FFF2-40B4-BE49-F238E27FC236}">
-                <a16:creationId xmlns="" xmlns:a16="http://schemas.microsoft.com/office/drawing/2014/main" id="{A093F50F-C593-40A9-95E7-FFE1F76D3966}"/>
+                <a16:creationId xmlns:a16="http://schemas.microsoft.com/office/drawing/2014/main" xmlns="" id="{A093F50F-C593-40A9-95E7-FFE1F76D3966}"/>
               </a:ext>
             </a:extLst>
           </p:cNvPr>
@@ -4172,7 +4139,7 @@
           <p:cNvPr id="3" name="Espace réservé du contenu 2">
             <a:extLst>
               <a:ext uri="{FF2B5EF4-FFF2-40B4-BE49-F238E27FC236}">
-                <a16:creationId xmlns="" xmlns:a16="http://schemas.microsoft.com/office/drawing/2014/main" id="{1A485B1E-6CDE-46C3-9E2C-1F013AFAAE45}"/>
+                <a16:creationId xmlns:a16="http://schemas.microsoft.com/office/drawing/2014/main" xmlns="" id="{1A485B1E-6CDE-46C3-9E2C-1F013AFAAE45}"/>
               </a:ext>
             </a:extLst>
           </p:cNvPr>
@@ -4211,11 +4178,7 @@
             </a:r>
             <a:r>
               <a:rPr lang="en-US"/>
-              <a:t>in codes (e.g. : "Count Dracula" -&gt; "a") in order to create a list that can easily be taken </a:t>
-            </a:r>
-            <a:r>
-              <a:rPr lang="en-US"/>
-              <a:t>as </a:t>
+              <a:t>in codes (e.g. : "Count Dracula" -&gt; "a") in order to create a list that can easily be taken as </a:t>
             </a:r>
             <a:r>
               <a:rPr lang="en-US" smtClean="0"/>
@@ -4256,11 +4219,7 @@
             <a:pPr lvl="1" fontAlgn="base"/>
             <a:r>
               <a:rPr lang="en-US"/>
-              <a:t>Converted character codes back </a:t>
-            </a:r>
-            <a:r>
-              <a:rPr lang="en-US"/>
-              <a:t>to </a:t>
+              <a:t>Converted character codes back to </a:t>
             </a:r>
             <a:r>
               <a:rPr lang="en-US" smtClean="0"/>
@@ -4312,7 +4271,7 @@
           <p:cNvPr id="2" name="Titre 1">
             <a:extLst>
               <a:ext uri="{FF2B5EF4-FFF2-40B4-BE49-F238E27FC236}">
-                <a16:creationId xmlns="" xmlns:a16="http://schemas.microsoft.com/office/drawing/2014/main" id="{A093F50F-C593-40A9-95E7-FFE1F76D3966}"/>
+                <a16:creationId xmlns:a16="http://schemas.microsoft.com/office/drawing/2014/main" xmlns="" id="{A093F50F-C593-40A9-95E7-FFE1F76D3966}"/>
               </a:ext>
             </a:extLst>
           </p:cNvPr>
@@ -4387,7 +4346,7 @@
           <p:cNvPr id="6" name="Espace réservé du contenu 2">
             <a:extLst>
               <a:ext uri="{FF2B5EF4-FFF2-40B4-BE49-F238E27FC236}">
-                <a16:creationId xmlns="" xmlns:a16="http://schemas.microsoft.com/office/drawing/2014/main" id="{1A485B1E-6CDE-46C3-9E2C-1F013AFAAE45}"/>
+                <a16:creationId xmlns:a16="http://schemas.microsoft.com/office/drawing/2014/main" xmlns="" id="{1A485B1E-6CDE-46C3-9E2C-1F013AFAAE45}"/>
               </a:ext>
             </a:extLst>
           </p:cNvPr>
@@ -4486,7 +4445,7 @@
           <p:cNvPr id="2" name="Titre 1">
             <a:extLst>
               <a:ext uri="{FF2B5EF4-FFF2-40B4-BE49-F238E27FC236}">
-                <a16:creationId xmlns="" xmlns:a16="http://schemas.microsoft.com/office/drawing/2014/main" id="{01FBDD91-A41B-4B21-811F-E25831E8830D}"/>
+                <a16:creationId xmlns:a16="http://schemas.microsoft.com/office/drawing/2014/main" xmlns="" id="{01FBDD91-A41B-4B21-811F-E25831E8830D}"/>
               </a:ext>
             </a:extLst>
           </p:cNvPr>
@@ -4526,7 +4485,7 @@
           <p:cNvPr id="3" name="Espace réservé du contenu 2">
             <a:extLst>
               <a:ext uri="{FF2B5EF4-FFF2-40B4-BE49-F238E27FC236}">
-                <a16:creationId xmlns="" xmlns:a16="http://schemas.microsoft.com/office/drawing/2014/main" id="{59D9F553-2551-4403-8986-4A7B277CD33B}"/>
+                <a16:creationId xmlns:a16="http://schemas.microsoft.com/office/drawing/2014/main" xmlns="" id="{59D9F553-2551-4403-8986-4A7B277CD33B}"/>
               </a:ext>
             </a:extLst>
           </p:cNvPr>
@@ -4749,7 +4708,7 @@
           <p:cNvPr id="5" name="Image 4">
             <a:extLst>
               <a:ext uri="{FF2B5EF4-FFF2-40B4-BE49-F238E27FC236}">
-                <a16:creationId xmlns="" xmlns:a16="http://schemas.microsoft.com/office/drawing/2014/main" id="{0B14C756-047D-447F-92C5-EE7DC973CD94}"/>
+                <a16:creationId xmlns:a16="http://schemas.microsoft.com/office/drawing/2014/main" xmlns="" id="{0B14C756-047D-447F-92C5-EE7DC973CD94}"/>
               </a:ext>
             </a:extLst>
           </p:cNvPr>
@@ -4809,7 +4768,7 @@
           <p:cNvPr id="2" name="Titre 1">
             <a:extLst>
               <a:ext uri="{FF2B5EF4-FFF2-40B4-BE49-F238E27FC236}">
-                <a16:creationId xmlns="" xmlns:a16="http://schemas.microsoft.com/office/drawing/2014/main" id="{C14150E0-2A78-4F7D-BFE7-AE2220A9FF63}"/>
+                <a16:creationId xmlns:a16="http://schemas.microsoft.com/office/drawing/2014/main" xmlns="" id="{C14150E0-2A78-4F7D-BFE7-AE2220A9FF63}"/>
               </a:ext>
             </a:extLst>
           </p:cNvPr>
@@ -4858,7 +4817,7 @@
           <p:cNvPr id="3" name="Espace réservé du contenu 2">
             <a:extLst>
               <a:ext uri="{FF2B5EF4-FFF2-40B4-BE49-F238E27FC236}">
-                <a16:creationId xmlns="" xmlns:a16="http://schemas.microsoft.com/office/drawing/2014/main" id="{C8D5C7A9-CBCC-4D39-8F63-A1587699988D}"/>
+                <a16:creationId xmlns:a16="http://schemas.microsoft.com/office/drawing/2014/main" xmlns="" id="{C8D5C7A9-CBCC-4D39-8F63-A1587699988D}"/>
               </a:ext>
             </a:extLst>
           </p:cNvPr>
@@ -4914,7 +4873,7 @@
           <p:cNvPr id="5" name="Image 4">
             <a:extLst>
               <a:ext uri="{FF2B5EF4-FFF2-40B4-BE49-F238E27FC236}">
-                <a16:creationId xmlns="" xmlns:a16="http://schemas.microsoft.com/office/drawing/2014/main" id="{FDA75C6B-C8F6-43AE-88CF-44E620EB32F3}"/>
+                <a16:creationId xmlns:a16="http://schemas.microsoft.com/office/drawing/2014/main" xmlns="" id="{FDA75C6B-C8F6-43AE-88CF-44E620EB32F3}"/>
               </a:ext>
             </a:extLst>
           </p:cNvPr>
@@ -4974,7 +4933,7 @@
           <p:cNvPr id="2" name="Titre 1">
             <a:extLst>
               <a:ext uri="{FF2B5EF4-FFF2-40B4-BE49-F238E27FC236}">
-                <a16:creationId xmlns="" xmlns:a16="http://schemas.microsoft.com/office/drawing/2014/main" id="{A093F50F-C593-40A9-95E7-FFE1F76D3966}"/>
+                <a16:creationId xmlns:a16="http://schemas.microsoft.com/office/drawing/2014/main" xmlns="" id="{A093F50F-C593-40A9-95E7-FFE1F76D3966}"/>
               </a:ext>
             </a:extLst>
           </p:cNvPr>
@@ -5008,7 +4967,7 @@
           <p:cNvPr id="3" name="Espace réservé du contenu 2">
             <a:extLst>
               <a:ext uri="{FF2B5EF4-FFF2-40B4-BE49-F238E27FC236}">
-                <a16:creationId xmlns="" xmlns:a16="http://schemas.microsoft.com/office/drawing/2014/main" id="{1A485B1E-6CDE-46C3-9E2C-1F013AFAAE45}"/>
+                <a16:creationId xmlns:a16="http://schemas.microsoft.com/office/drawing/2014/main" xmlns="" id="{1A485B1E-6CDE-46C3-9E2C-1F013AFAAE45}"/>
               </a:ext>
             </a:extLst>
           </p:cNvPr>
@@ -5031,20 +4990,59 @@
           </a:bodyPr>
           <a:lstStyle/>
           <a:p>
-            <a:pPr marL="0" indent="0">
-              <a:buNone/>
-            </a:pPr>
-            <a:r>
-              <a:rPr lang="fr-BE" b="1" smtClean="0"/>
-              <a:t>LIMITS</a:t>
-            </a:r>
-            <a:endParaRPr lang="fr-BE" b="1"/>
-          </a:p>
-          <a:p>
             <a:r>
               <a:rPr lang="en-US" smtClean="0"/>
-              <a:t>Item</a:t>
-            </a:r>
+              <a:t>Dracula = mysterious character, elusive to text mining</a:t>
+            </a:r>
+          </a:p>
+          <a:p>
+            <a:r>
+              <a:rPr lang="en-US" smtClean="0"/>
+              <a:t>“Goal “of the novel : to paint his picture with not many informations</a:t>
+            </a:r>
+          </a:p>
+          <a:p>
+            <a:r>
+              <a:rPr lang="en-US" smtClean="0"/>
+              <a:t>Epistolary style</a:t>
+            </a:r>
+            <a:r>
+              <a:rPr lang="en-US"/>
+              <a:t> </a:t>
+            </a:r>
+            <a:r>
+              <a:rPr lang="en-US" smtClean="0"/>
+              <a:t>:</a:t>
+            </a:r>
+          </a:p>
+          <a:p>
+            <a:pPr lvl="1"/>
+            <a:r>
+              <a:rPr lang="en-US" smtClean="0"/>
+              <a:t>It’s hard to find continuty or development because of changing POV</a:t>
+            </a:r>
+          </a:p>
+          <a:p>
+            <a:pPr lvl="1"/>
+            <a:r>
+              <a:rPr lang="en-US" smtClean="0"/>
+              <a:t>Investigate  the novel by diary entries ?</a:t>
+            </a:r>
+          </a:p>
+          <a:p>
+            <a:r>
+              <a:rPr lang="en-US" smtClean="0"/>
+              <a:t>More knowledge of past analysis of </a:t>
+            </a:r>
+            <a:r>
+              <a:rPr lang="en-US" i="1" smtClean="0"/>
+              <a:t>Dracula</a:t>
+            </a:r>
+            <a:r>
+              <a:rPr lang="en-US" smtClean="0"/>
+              <a:t> would be helpful</a:t>
+            </a:r>
+            <a:endParaRPr lang="en-US" smtClean="0"/>
           </a:p>
         </p:txBody>
       </p:sp>
@@ -5083,7 +5081,7 @@
           <p:cNvPr id="2" name="Titre 1">
             <a:extLst>
               <a:ext uri="{FF2B5EF4-FFF2-40B4-BE49-F238E27FC236}">
-                <a16:creationId xmlns="" xmlns:a16="http://schemas.microsoft.com/office/drawing/2014/main" id="{A093F50F-C593-40A9-95E7-FFE1F76D3966}"/>
+                <a16:creationId xmlns:a16="http://schemas.microsoft.com/office/drawing/2014/main" xmlns="" id="{A093F50F-C593-40A9-95E7-FFE1F76D3966}"/>
               </a:ext>
             </a:extLst>
           </p:cNvPr>
@@ -5117,7 +5115,7 @@
           <p:cNvPr id="3" name="Espace réservé du contenu 2">
             <a:extLst>
               <a:ext uri="{FF2B5EF4-FFF2-40B4-BE49-F238E27FC236}">
-                <a16:creationId xmlns="" xmlns:a16="http://schemas.microsoft.com/office/drawing/2014/main" id="{1A485B1E-6CDE-46C3-9E2C-1F013AFAAE45}"/>
+                <a16:creationId xmlns:a16="http://schemas.microsoft.com/office/drawing/2014/main" xmlns="" id="{1A485B1E-6CDE-46C3-9E2C-1F013AFAAE45}"/>
               </a:ext>
             </a:extLst>
           </p:cNvPr>
@@ -5136,7 +5134,7 @@
         </p:spPr>
         <p:txBody>
           <a:bodyPr>
-            <a:normAutofit/>
+            <a:normAutofit lnSpcReduction="10000"/>
           </a:bodyPr>
           <a:lstStyle/>
           <a:p>
@@ -5152,8 +5150,73 @@
           <a:p>
             <a:r>
               <a:rPr lang="en-US" smtClean="0"/>
-              <a:t>Item</a:t>
-            </a:r>
+              <a:t>No concern in this project, but in general n</a:t>
+            </a:r>
+            <a:r>
+              <a:rPr lang="en-US" smtClean="0"/>
+              <a:t>atural language processing…</a:t>
+            </a:r>
+          </a:p>
+          <a:p>
+            <a:r>
+              <a:rPr lang="en-US" smtClean="0"/>
+              <a:t>Text on online services (Twitter etc) either:</a:t>
+            </a:r>
+          </a:p>
+          <a:p>
+            <a:pPr lvl="1"/>
+            <a:r>
+              <a:rPr lang="en-US" smtClean="0"/>
+              <a:t>Free of use</a:t>
+            </a:r>
+          </a:p>
+          <a:p>
+            <a:pPr lvl="1"/>
+            <a:r>
+              <a:rPr lang="en-US" smtClean="0"/>
+              <a:t>Made vulnerable by security failures</a:t>
+            </a:r>
+          </a:p>
+          <a:p>
+            <a:r>
+              <a:rPr lang="en-US" smtClean="0"/>
+              <a:t>Which can be used to:</a:t>
+            </a:r>
+          </a:p>
+          <a:p>
+            <a:pPr lvl="1"/>
+            <a:r>
+              <a:rPr lang="en-US" smtClean="0"/>
+              <a:t>Influence customers to buy products</a:t>
+            </a:r>
+          </a:p>
+          <a:p>
+            <a:pPr lvl="1"/>
+            <a:r>
+              <a:rPr lang="en-US" smtClean="0"/>
+              <a:t>Influence voters and change political landscape</a:t>
+            </a:r>
+          </a:p>
+          <a:p>
+            <a:r>
+              <a:rPr lang="en-US" smtClean="0"/>
+              <a:t>But there are benefits :</a:t>
+            </a:r>
+          </a:p>
+          <a:p>
+            <a:pPr lvl="1"/>
+            <a:r>
+              <a:rPr lang="en-US" smtClean="0"/>
+              <a:t>More access to technology</a:t>
+            </a:r>
+          </a:p>
+          <a:p>
+            <a:pPr lvl="1"/>
+            <a:r>
+              <a:rPr lang="en-US" smtClean="0"/>
+              <a:t>More informational equality</a:t>
+            </a:r>
+            <a:endParaRPr lang="en-US" smtClean="0"/>
           </a:p>
         </p:txBody>
       </p:sp>
@@ -5161,6 +5224,93 @@
     <p:extLst>
       <p:ext uri="{BB962C8B-B14F-4D97-AF65-F5344CB8AC3E}">
         <p14:creationId xmlns:p14="http://schemas.microsoft.com/office/powerpoint/2010/main" val="2417756305"/>
+      </p:ext>
+    </p:extLst>
+  </p:cSld>
+  <p:clrMapOvr>
+    <a:masterClrMapping/>
+  </p:clrMapOvr>
+</p:sld>
+</file>
+
+<file path=ppt/slides/slide19.xml><?xml version="1.0" encoding="utf-8"?>
+<p:sld xmlns:a="http://schemas.openxmlformats.org/drawingml/2006/main" xmlns:r="http://schemas.openxmlformats.org/officeDocument/2006/relationships" xmlns:p="http://schemas.openxmlformats.org/presentationml/2006/main">
+  <p:cSld>
+    <p:spTree>
+      <p:nvGrpSpPr>
+        <p:cNvPr id="1" name=""/>
+        <p:cNvGrpSpPr/>
+        <p:nvPr/>
+      </p:nvGrpSpPr>
+      <p:grpSpPr>
+        <a:xfrm>
+          <a:off x="0" y="0"/>
+          <a:ext cx="0" cy="0"/>
+          <a:chOff x="0" y="0"/>
+          <a:chExt cx="0" cy="0"/>
+        </a:xfrm>
+      </p:grpSpPr>
+      <p:sp>
+        <p:nvSpPr>
+          <p:cNvPr id="2" name="Titre 1">
+            <a:extLst>
+              <a:ext uri="{FF2B5EF4-FFF2-40B4-BE49-F238E27FC236}">
+                <a16:creationId xmlns:a16="http://schemas.microsoft.com/office/drawing/2014/main" xmlns="" id="{A093F50F-C593-40A9-95E7-FFE1F76D3966}"/>
+              </a:ext>
+            </a:extLst>
+          </p:cNvPr>
+          <p:cNvSpPr>
+            <a:spLocks noGrp="1"/>
+          </p:cNvSpPr>
+          <p:nvPr>
+            <p:ph type="title"/>
+          </p:nvPr>
+        </p:nvSpPr>
+        <p:spPr>
+          <a:xfrm>
+            <a:off x="1282766" y="1561514"/>
+            <a:ext cx="9291215" cy="3348110"/>
+          </a:xfrm>
+        </p:spPr>
+        <p:txBody>
+          <a:bodyPr>
+            <a:normAutofit/>
+          </a:bodyPr>
+          <a:lstStyle/>
+          <a:p>
+            <a:r>
+              <a:rPr lang="fr-BE" sz="4800" smtClean="0"/>
+              <a:t>Thank you for your</a:t>
+            </a:r>
+            <a:br>
+              <a:rPr lang="fr-BE" sz="4800" smtClean="0"/>
+            </a:br>
+            <a:r>
+              <a:rPr lang="fr-BE" sz="4800" smtClean="0"/>
+              <a:t>attention ! :-)</a:t>
+            </a:r>
+            <a:br>
+              <a:rPr lang="fr-BE" sz="4800" smtClean="0"/>
+            </a:br>
+            <a:r>
+              <a:rPr lang="fr-BE" sz="4800"/>
+              <a:t/>
+            </a:r>
+            <a:br>
+              <a:rPr lang="fr-BE" sz="4800"/>
+            </a:br>
+            <a:r>
+              <a:rPr lang="fr-BE" sz="4800" smtClean="0"/>
+              <a:t>Any questions ?</a:t>
+            </a:r>
+            <a:endParaRPr lang="fr-BE" sz="4800"/>
+          </a:p>
+        </p:txBody>
+      </p:sp>
+    </p:spTree>
+    <p:extLst>
+      <p:ext uri="{BB962C8B-B14F-4D97-AF65-F5344CB8AC3E}">
+        <p14:creationId xmlns:p14="http://schemas.microsoft.com/office/powerpoint/2010/main" val="171819445"/>
       </p:ext>
     </p:extLst>
   </p:cSld>
@@ -5192,7 +5342,7 @@
           <p:cNvPr id="2" name="Titre 1">
             <a:extLst>
               <a:ext uri="{FF2B5EF4-FFF2-40B4-BE49-F238E27FC236}">
-                <a16:creationId xmlns="" xmlns:a16="http://schemas.microsoft.com/office/drawing/2014/main" id="{A093F50F-C593-40A9-95E7-FFE1F76D3966}"/>
+                <a16:creationId xmlns:a16="http://schemas.microsoft.com/office/drawing/2014/main" xmlns="" id="{A093F50F-C593-40A9-95E7-FFE1F76D3966}"/>
               </a:ext>
             </a:extLst>
           </p:cNvPr>
@@ -5221,7 +5371,7 @@
           <p:cNvPr id="3" name="Espace réservé du contenu 2">
             <a:extLst>
               <a:ext uri="{FF2B5EF4-FFF2-40B4-BE49-F238E27FC236}">
-                <a16:creationId xmlns="" xmlns:a16="http://schemas.microsoft.com/office/drawing/2014/main" id="{1A485B1E-6CDE-46C3-9E2C-1F013AFAAE45}"/>
+                <a16:creationId xmlns:a16="http://schemas.microsoft.com/office/drawing/2014/main" xmlns="" id="{1A485B1E-6CDE-46C3-9E2C-1F013AFAAE45}"/>
               </a:ext>
             </a:extLst>
           </p:cNvPr>
@@ -5245,11 +5395,7 @@
           <a:p>
             <a:r>
               <a:rPr lang="fr-BE"/>
-              <a:t>Synopsis : a perfect couple</a:t>
-            </a:r>
-            <a:r>
-              <a:rPr lang="fr-BE"/>
-              <a:t>, </a:t>
+              <a:t>Synopsis : a perfect couple, </a:t>
             </a:r>
             <a:r>
               <a:rPr lang="fr-BE" smtClean="0"/>
@@ -5314,7 +5460,7 @@
           <p:cNvPr id="2" name="Titre 1">
             <a:extLst>
               <a:ext uri="{FF2B5EF4-FFF2-40B4-BE49-F238E27FC236}">
-                <a16:creationId xmlns="" xmlns:a16="http://schemas.microsoft.com/office/drawing/2014/main" id="{A093F50F-C593-40A9-95E7-FFE1F76D3966}"/>
+                <a16:creationId xmlns:a16="http://schemas.microsoft.com/office/drawing/2014/main" xmlns="" id="{A093F50F-C593-40A9-95E7-FFE1F76D3966}"/>
               </a:ext>
             </a:extLst>
           </p:cNvPr>
@@ -5343,7 +5489,7 @@
           <p:cNvPr id="3" name="Espace réservé du contenu 2">
             <a:extLst>
               <a:ext uri="{FF2B5EF4-FFF2-40B4-BE49-F238E27FC236}">
-                <a16:creationId xmlns="" xmlns:a16="http://schemas.microsoft.com/office/drawing/2014/main" id="{1A485B1E-6CDE-46C3-9E2C-1F013AFAAE45}"/>
+                <a16:creationId xmlns:a16="http://schemas.microsoft.com/office/drawing/2014/main" xmlns="" id="{1A485B1E-6CDE-46C3-9E2C-1F013AFAAE45}"/>
               </a:ext>
             </a:extLst>
           </p:cNvPr>
@@ -5448,7 +5594,7 @@
           <p:cNvPr id="2" name="Titre 1">
             <a:extLst>
               <a:ext uri="{FF2B5EF4-FFF2-40B4-BE49-F238E27FC236}">
-                <a16:creationId xmlns="" xmlns:a16="http://schemas.microsoft.com/office/drawing/2014/main" id="{1B0421F2-61B6-48A3-9B08-0D565C5DE0FF}"/>
+                <a16:creationId xmlns:a16="http://schemas.microsoft.com/office/drawing/2014/main" xmlns="" id="{1B0421F2-61B6-48A3-9B08-0D565C5DE0FF}"/>
               </a:ext>
             </a:extLst>
           </p:cNvPr>
@@ -5485,7 +5631,7 @@
           <p:cNvPr id="3" name="Espace réservé du contenu 2">
             <a:extLst>
               <a:ext uri="{FF2B5EF4-FFF2-40B4-BE49-F238E27FC236}">
-                <a16:creationId xmlns="" xmlns:a16="http://schemas.microsoft.com/office/drawing/2014/main" id="{26C0DD74-2A72-4E31-BCBE-C3917A21439F}"/>
+                <a16:creationId xmlns:a16="http://schemas.microsoft.com/office/drawing/2014/main" xmlns="" id="{26C0DD74-2A72-4E31-BCBE-C3917A21439F}"/>
               </a:ext>
             </a:extLst>
           </p:cNvPr>
@@ -5692,7 +5838,7 @@
           <p:cNvPr id="2" name="Titre 1">
             <a:extLst>
               <a:ext uri="{FF2B5EF4-FFF2-40B4-BE49-F238E27FC236}">
-                <a16:creationId xmlns="" xmlns:a16="http://schemas.microsoft.com/office/drawing/2014/main" id="{49C4B582-E099-4FC5-9479-E8A169D73731}"/>
+                <a16:creationId xmlns:a16="http://schemas.microsoft.com/office/drawing/2014/main" xmlns="" id="{49C4B582-E099-4FC5-9479-E8A169D73731}"/>
               </a:ext>
             </a:extLst>
           </p:cNvPr>
@@ -5720,7 +5866,7 @@
           <p:cNvPr id="3" name="Espace réservé du contenu 2">
             <a:extLst>
               <a:ext uri="{FF2B5EF4-FFF2-40B4-BE49-F238E27FC236}">
-                <a16:creationId xmlns="" xmlns:a16="http://schemas.microsoft.com/office/drawing/2014/main" id="{C03B7812-397A-41A8-BF52-A6504BE74B37}"/>
+                <a16:creationId xmlns:a16="http://schemas.microsoft.com/office/drawing/2014/main" xmlns="" id="{C03B7812-397A-41A8-BF52-A6504BE74B37}"/>
               </a:ext>
             </a:extLst>
           </p:cNvPr>
@@ -5868,7 +6014,7 @@
           <p:cNvPr id="2" name="Titre 1">
             <a:extLst>
               <a:ext uri="{FF2B5EF4-FFF2-40B4-BE49-F238E27FC236}">
-                <a16:creationId xmlns="" xmlns:a16="http://schemas.microsoft.com/office/drawing/2014/main" id="{F2477979-5622-459C-B989-5A4097664795}"/>
+                <a16:creationId xmlns:a16="http://schemas.microsoft.com/office/drawing/2014/main" xmlns="" id="{F2477979-5622-459C-B989-5A4097664795}"/>
               </a:ext>
             </a:extLst>
           </p:cNvPr>
@@ -5901,7 +6047,7 @@
           <p:cNvPr id="3" name="Espace réservé du contenu 2">
             <a:extLst>
               <a:ext uri="{FF2B5EF4-FFF2-40B4-BE49-F238E27FC236}">
-                <a16:creationId xmlns="" xmlns:a16="http://schemas.microsoft.com/office/drawing/2014/main" id="{0F91CB54-8CAD-4E1B-8EF2-9ECA173B34B5}"/>
+                <a16:creationId xmlns:a16="http://schemas.microsoft.com/office/drawing/2014/main" xmlns="" id="{0F91CB54-8CAD-4E1B-8EF2-9ECA173B34B5}"/>
               </a:ext>
             </a:extLst>
           </p:cNvPr>
@@ -6033,7 +6179,7 @@
           <p:cNvPr id="1026" name="Picture 2" descr="https://lh6.googleusercontent.com/HyqY--K02gZ8Ziqz4zUUTRxP_TI6CLVPAKogQKPJ1I8RMwpASKyEG2UN_wT56LSnPRrJU0HOlcDGIsP6reJZyRzc2RcaZPW8ZImaPpp9gaxcQli37YqX1oXMgpuIlTDpyDB0BY5F">
             <a:extLst>
               <a:ext uri="{FF2B5EF4-FFF2-40B4-BE49-F238E27FC236}">
-                <a16:creationId xmlns="" xmlns:a16="http://schemas.microsoft.com/office/drawing/2014/main" id="{6ED5F093-21A9-4AA8-B20B-A9AF184B1D71}"/>
+                <a16:creationId xmlns:a16="http://schemas.microsoft.com/office/drawing/2014/main" xmlns="" id="{6ED5F093-21A9-4AA8-B20B-A9AF184B1D71}"/>
               </a:ext>
             </a:extLst>
           </p:cNvPr>
@@ -6080,7 +6226,7 @@
           <p:cNvPr id="5" name="Image 4">
             <a:extLst>
               <a:ext uri="{FF2B5EF4-FFF2-40B4-BE49-F238E27FC236}">
-                <a16:creationId xmlns="" xmlns:a16="http://schemas.microsoft.com/office/drawing/2014/main" id="{AD26E13A-B428-4515-9190-B3EBD84B91F3}"/>
+                <a16:creationId xmlns:a16="http://schemas.microsoft.com/office/drawing/2014/main" xmlns="" id="{AD26E13A-B428-4515-9190-B3EBD84B91F3}"/>
               </a:ext>
             </a:extLst>
           </p:cNvPr>
@@ -6140,7 +6286,7 @@
           <p:cNvPr id="2" name="Titre 1">
             <a:extLst>
               <a:ext uri="{FF2B5EF4-FFF2-40B4-BE49-F238E27FC236}">
-                <a16:creationId xmlns="" xmlns:a16="http://schemas.microsoft.com/office/drawing/2014/main" id="{93F84DE8-AD66-4873-A835-8CF8B95ADF22}"/>
+                <a16:creationId xmlns:a16="http://schemas.microsoft.com/office/drawing/2014/main" xmlns="" id="{93F84DE8-AD66-4873-A835-8CF8B95ADF22}"/>
               </a:ext>
             </a:extLst>
           </p:cNvPr>
@@ -6168,7 +6314,7 @@
           <p:cNvPr id="3" name="Espace réservé du contenu 2">
             <a:extLst>
               <a:ext uri="{FF2B5EF4-FFF2-40B4-BE49-F238E27FC236}">
-                <a16:creationId xmlns="" xmlns:a16="http://schemas.microsoft.com/office/drawing/2014/main" id="{C73F5A3D-E7B7-4D43-B2A7-7F0F78F8C9E2}"/>
+                <a16:creationId xmlns:a16="http://schemas.microsoft.com/office/drawing/2014/main" xmlns="" id="{C73F5A3D-E7B7-4D43-B2A7-7F0F78F8C9E2}"/>
               </a:ext>
             </a:extLst>
           </p:cNvPr>
@@ -6283,7 +6429,7 @@
           <p:cNvPr id="5" name="Image 4">
             <a:extLst>
               <a:ext uri="{FF2B5EF4-FFF2-40B4-BE49-F238E27FC236}">
-                <a16:creationId xmlns="" xmlns:a16="http://schemas.microsoft.com/office/drawing/2014/main" id="{BC12680B-CE48-4DE8-B7E6-D3A3FCC23BCC}"/>
+                <a16:creationId xmlns:a16="http://schemas.microsoft.com/office/drawing/2014/main" xmlns="" id="{BC12680B-CE48-4DE8-B7E6-D3A3FCC23BCC}"/>
               </a:ext>
             </a:extLst>
           </p:cNvPr>
@@ -6343,7 +6489,7 @@
           <p:cNvPr id="2" name="Titre 1">
             <a:extLst>
               <a:ext uri="{FF2B5EF4-FFF2-40B4-BE49-F238E27FC236}">
-                <a16:creationId xmlns="" xmlns:a16="http://schemas.microsoft.com/office/drawing/2014/main" id="{860E1C3F-1645-456F-AE7A-8A9430CCAC3E}"/>
+                <a16:creationId xmlns:a16="http://schemas.microsoft.com/office/drawing/2014/main" xmlns="" id="{860E1C3F-1645-456F-AE7A-8A9430CCAC3E}"/>
               </a:ext>
             </a:extLst>
           </p:cNvPr>
@@ -6371,7 +6517,7 @@
           <p:cNvPr id="3" name="Espace réservé du contenu 2">
             <a:extLst>
               <a:ext uri="{FF2B5EF4-FFF2-40B4-BE49-F238E27FC236}">
-                <a16:creationId xmlns="" xmlns:a16="http://schemas.microsoft.com/office/drawing/2014/main" id="{F91A640E-B1A7-4F54-9FFF-0FEFA4EC8EE1}"/>
+                <a16:creationId xmlns:a16="http://schemas.microsoft.com/office/drawing/2014/main" xmlns="" id="{F91A640E-B1A7-4F54-9FFF-0FEFA4EC8EE1}"/>
               </a:ext>
             </a:extLst>
           </p:cNvPr>
@@ -6628,7 +6774,7 @@
           <p:cNvPr id="2" name="Titre 1">
             <a:extLst>
               <a:ext uri="{FF2B5EF4-FFF2-40B4-BE49-F238E27FC236}">
-                <a16:creationId xmlns="" xmlns:a16="http://schemas.microsoft.com/office/drawing/2014/main" id="{34F54331-F0AA-4796-88CA-4B3366C243B2}"/>
+                <a16:creationId xmlns:a16="http://schemas.microsoft.com/office/drawing/2014/main" xmlns="" id="{34F54331-F0AA-4796-88CA-4B3366C243B2}"/>
               </a:ext>
             </a:extLst>
           </p:cNvPr>
@@ -6670,7 +6816,7 @@
           <p:cNvPr id="3" name="Espace réservé du contenu 2">
             <a:extLst>
               <a:ext uri="{FF2B5EF4-FFF2-40B4-BE49-F238E27FC236}">
-                <a16:creationId xmlns="" xmlns:a16="http://schemas.microsoft.com/office/drawing/2014/main" id="{52052228-2A80-4411-B714-4B7F17F3752F}"/>
+                <a16:creationId xmlns:a16="http://schemas.microsoft.com/office/drawing/2014/main" xmlns="" id="{52052228-2A80-4411-B714-4B7F17F3752F}"/>
               </a:ext>
             </a:extLst>
           </p:cNvPr>
@@ -6923,7 +7069,7 @@
           <p:cNvPr id="2052" name="Picture 4" descr="https://lh6.googleusercontent.com/mQOVeYBH0U4wSeExCqUw4zdAM0t05THRPdt38N83Hj7S33yBWJcKfnwVnNlHPO-XSklnarqSPfvEC-OswOEpXK9PePuPtLuwVqiFSXElyHzM19e1DkNLlpf5k8xPXNEyriRgBI-b">
             <a:extLst>
               <a:ext uri="{FF2B5EF4-FFF2-40B4-BE49-F238E27FC236}">
-                <a16:creationId xmlns="" xmlns:a16="http://schemas.microsoft.com/office/drawing/2014/main" id="{C123597C-615B-4E45-AE78-6CA8B8344FB7}"/>
+                <a16:creationId xmlns:a16="http://schemas.microsoft.com/office/drawing/2014/main" xmlns="" id="{C123597C-615B-4E45-AE78-6CA8B8344FB7}"/>
               </a:ext>
             </a:extLst>
           </p:cNvPr>
@@ -7225,7 +7371,7 @@
   <a:extraClrSchemeLst/>
   <a:extLst>
     <a:ext uri="{05A4C25C-085E-4340-85A3-A5531E510DB2}">
-      <thm15:themeFamily xmlns="" xmlns:thm15="http://schemas.microsoft.com/office/thememl/2012/main" name="Gallery" id="{BBFCD31E-59A1-489D-B089-A3EAD7CAE12E}" vid="{BB5F5D82-B5E9-469E-A815-C655ED4AF243}"/>
+      <thm15:themeFamily xmlns:thm15="http://schemas.microsoft.com/office/thememl/2012/main" xmlns="" name="Gallery" id="{BBFCD31E-59A1-489D-B089-A3EAD7CAE12E}" vid="{BB5F5D82-B5E9-469E-A815-C655ED4AF243}"/>
     </a:ext>
   </a:extLst>
 </a:theme>

</xml_diff>